<commit_message>
Updated files(Not yet done)
</commit_message>
<xml_diff>
--- a/docs/project 2/Project Presentation (154409 - Emmanuel Maneswa).pptx
+++ b/docs/project 2/Project Presentation (154409 - Emmanuel Maneswa).pptx
@@ -1,20 +1,30 @@
 
 <file path=ppt/presentation.xml><?xml version="1.0" encoding="utf-8"?>
-<p:presentation xmlns:a="http://schemas.openxmlformats.org/drawingml/2006/main" xmlns:r="http://schemas.openxmlformats.org/officeDocument/2006/relationships" xmlns:p="http://schemas.openxmlformats.org/presentationml/2006/main" saveSubsetFonts="1">
+<p:presentation xmlns:a="http://schemas.openxmlformats.org/drawingml/2006/main" xmlns:r="http://schemas.openxmlformats.org/officeDocument/2006/relationships" xmlns:p="http://schemas.openxmlformats.org/presentationml/2006/main">
   <p:sldMasterIdLst>
     <p:sldMasterId id="2147483648" r:id="rId1"/>
   </p:sldMasterIdLst>
+  <p:notesMasterIdLst>
+    <p:notesMasterId r:id="rId16"/>
+  </p:notesMasterIdLst>
   <p:sldIdLst>
-    <p:sldId id="256" r:id="rId2"/>
-    <p:sldId id="258" r:id="rId3"/>
-    <p:sldId id="259" r:id="rId4"/>
-    <p:sldId id="260" r:id="rId5"/>
-    <p:sldId id="261" r:id="rId6"/>
-    <p:sldId id="262" r:id="rId7"/>
-    <p:sldId id="263" r:id="rId8"/>
-    <p:sldId id="264" r:id="rId9"/>
-    <p:sldId id="265" r:id="rId10"/>
-    <p:sldId id="266" r:id="rId11"/>
+    <p:sldId id="256" r:id="rId3"/>
+    <p:sldId id="258" r:id="rId4"/>
+    <p:sldId id="259" r:id="rId5"/>
+    <p:sldId id="267" r:id="rId6"/>
+    <p:sldId id="269" r:id="rId7"/>
+    <p:sldId id="268" r:id="rId8"/>
+    <p:sldId id="260" r:id="rId9"/>
+    <p:sldId id="261" r:id="rId10"/>
+    <p:sldId id="270" r:id="rId11"/>
+    <p:sldId id="271" r:id="rId12"/>
+    <p:sldId id="272" r:id="rId13"/>
+    <p:sldId id="273" r:id="rId14"/>
+    <p:sldId id="274" r:id="rId15"/>
+    <p:sldId id="262" r:id="rId17"/>
+    <p:sldId id="275" r:id="rId18"/>
+    <p:sldId id="263" r:id="rId19"/>
+    <p:sldId id="276" r:id="rId20"/>
   </p:sldIdLst>
   <p:sldSz cx="9144000" cy="6858000" type="screen4x3"/>
   <p:notesSz cx="6858000" cy="9144000"/>
@@ -116,6 +126,397 @@
 </p:presentation>
 </file>
 
+<file path=ppt/notesMasters/notesMaster1.xml><?xml version="1.0" encoding="utf-8"?>
+<p:notesMaster xmlns:a="http://schemas.openxmlformats.org/drawingml/2006/main" xmlns:r="http://schemas.openxmlformats.org/officeDocument/2006/relationships" xmlns:p="http://schemas.openxmlformats.org/presentationml/2006/main">
+  <p:cSld>
+    <p:bg>
+      <p:bgRef idx="1001">
+        <a:schemeClr val="bg1"/>
+      </p:bgRef>
+    </p:bg>
+    <p:spTree>
+      <p:nvGrpSpPr>
+        <p:cNvPr id="1" name=""/>
+        <p:cNvGrpSpPr/>
+        <p:nvPr/>
+      </p:nvGrpSpPr>
+      <p:grpSpPr>
+        <a:xfrm>
+          <a:off x="0" y="0"/>
+          <a:ext cx="0" cy="0"/>
+          <a:chOff x="0" y="0"/>
+          <a:chExt cx="0" cy="0"/>
+        </a:xfrm>
+      </p:grpSpPr>
+      <p:sp>
+        <p:nvSpPr>
+          <p:cNvPr id="2" name="Header Placeholder 1"/>
+          <p:cNvSpPr>
+            <a:spLocks noGrp="1"/>
+          </p:cNvSpPr>
+          <p:nvPr>
+            <p:ph type="hdr" sz="quarter"/>
+          </p:nvPr>
+        </p:nvSpPr>
+        <p:spPr>
+          <a:xfrm>
+            <a:off x="0" y="0"/>
+            <a:ext cx="2971800" cy="458788"/>
+          </a:xfrm>
+          <a:prstGeom prst="rect">
+            <a:avLst/>
+          </a:prstGeom>
+        </p:spPr>
+        <p:txBody>
+          <a:bodyPr vert="horz" lIns="91440" tIns="45720" rIns="91440" bIns="45720" rtlCol="0"/>
+          <a:lstStyle>
+            <a:lvl1pPr algn="l">
+              <a:defRPr sz="1200"/>
+            </a:lvl1pPr>
+          </a:lstStyle>
+          <a:p>
+            <a:endParaRPr lang="en-US"/>
+          </a:p>
+        </p:txBody>
+      </p:sp>
+      <p:sp>
+        <p:nvSpPr>
+          <p:cNvPr id="3" name="Date Placeholder 2"/>
+          <p:cNvSpPr>
+            <a:spLocks noGrp="1"/>
+          </p:cNvSpPr>
+          <p:nvPr>
+            <p:ph type="dt" idx="1"/>
+          </p:nvPr>
+        </p:nvSpPr>
+        <p:spPr>
+          <a:xfrm>
+            <a:off x="3884613" y="0"/>
+            <a:ext cx="2971800" cy="458788"/>
+          </a:xfrm>
+          <a:prstGeom prst="rect">
+            <a:avLst/>
+          </a:prstGeom>
+        </p:spPr>
+        <p:txBody>
+          <a:bodyPr vert="horz" lIns="91440" tIns="45720" rIns="91440" bIns="45720" rtlCol="0"/>
+          <a:lstStyle>
+            <a:lvl1pPr algn="r">
+              <a:defRPr sz="1200"/>
+            </a:lvl1pPr>
+          </a:lstStyle>
+          <a:p>
+            <a:fld id="{3EFD42F7-718C-4B98-AAEC-167E6DDD60A7}" type="datetimeFigureOut">
+              <a:rPr lang="en-US" smtClean="0"/>
+            </a:fld>
+            <a:endParaRPr lang="en-US"/>
+          </a:p>
+        </p:txBody>
+      </p:sp>
+      <p:sp>
+        <p:nvSpPr>
+          <p:cNvPr id="4" name="Slide Image Placeholder 3"/>
+          <p:cNvSpPr>
+            <a:spLocks noGrp="1" noRot="1" noChangeAspect="1"/>
+          </p:cNvSpPr>
+          <p:nvPr>
+            <p:ph type="sldImg" idx="2"/>
+          </p:nvPr>
+        </p:nvSpPr>
+        <p:spPr>
+          <a:xfrm>
+            <a:off x="1371600" y="1143000"/>
+            <a:ext cx="4114800" cy="3086100"/>
+          </a:xfrm>
+          <a:prstGeom prst="rect">
+            <a:avLst/>
+          </a:prstGeom>
+          <a:noFill/>
+          <a:ln w="12700">
+            <a:solidFill>
+              <a:prstClr val="black"/>
+            </a:solidFill>
+          </a:ln>
+        </p:spPr>
+        <p:txBody>
+          <a:bodyPr vert="horz" lIns="91440" tIns="45720" rIns="91440" bIns="45720" rtlCol="0" anchor="ctr"/>
+          <a:lstStyle/>
+          <a:p>
+            <a:endParaRPr lang="en-US"/>
+          </a:p>
+        </p:txBody>
+      </p:sp>
+      <p:sp>
+        <p:nvSpPr>
+          <p:cNvPr id="5" name="Notes Placeholder 4"/>
+          <p:cNvSpPr>
+            <a:spLocks noGrp="1"/>
+          </p:cNvSpPr>
+          <p:nvPr>
+            <p:ph type="body" sz="quarter" idx="3"/>
+          </p:nvPr>
+        </p:nvSpPr>
+        <p:spPr>
+          <a:xfrm>
+            <a:off x="685800" y="4400550"/>
+            <a:ext cx="5486400" cy="3600450"/>
+          </a:xfrm>
+          <a:prstGeom prst="rect">
+            <a:avLst/>
+          </a:prstGeom>
+        </p:spPr>
+        <p:txBody>
+          <a:bodyPr vert="horz" lIns="91440" tIns="45720" rIns="91440" bIns="45720" rtlCol="0"/>
+          <a:lstStyle/>
+          <a:p>
+            <a:pPr lvl="0"/>
+            <a:r>
+              <a:rPr lang="en-US" smtClean="0"/>
+              <a:t>Click to edit Master text styles</a:t>
+            </a:r>
+            <a:endParaRPr lang="en-US" smtClean="0"/>
+          </a:p>
+          <a:p>
+            <a:pPr lvl="1"/>
+            <a:r>
+              <a:rPr lang="en-US" smtClean="0"/>
+              <a:t>Second level</a:t>
+            </a:r>
+            <a:endParaRPr lang="en-US" smtClean="0"/>
+          </a:p>
+          <a:p>
+            <a:pPr lvl="2"/>
+            <a:r>
+              <a:rPr lang="en-US" smtClean="0"/>
+              <a:t>Third level</a:t>
+            </a:r>
+            <a:endParaRPr lang="en-US" smtClean="0"/>
+          </a:p>
+          <a:p>
+            <a:pPr lvl="3"/>
+            <a:r>
+              <a:rPr lang="en-US" smtClean="0"/>
+              <a:t>Fourth level</a:t>
+            </a:r>
+            <a:endParaRPr lang="en-US" smtClean="0"/>
+          </a:p>
+          <a:p>
+            <a:pPr lvl="4"/>
+            <a:r>
+              <a:rPr lang="en-US" smtClean="0"/>
+              <a:t>Fifth level</a:t>
+            </a:r>
+            <a:endParaRPr lang="en-US"/>
+          </a:p>
+        </p:txBody>
+      </p:sp>
+      <p:sp>
+        <p:nvSpPr>
+          <p:cNvPr id="6" name="Footer Placeholder 5"/>
+          <p:cNvSpPr>
+            <a:spLocks noGrp="1"/>
+          </p:cNvSpPr>
+          <p:nvPr>
+            <p:ph type="ftr" sz="quarter" idx="4"/>
+          </p:nvPr>
+        </p:nvSpPr>
+        <p:spPr>
+          <a:xfrm>
+            <a:off x="0" y="8685213"/>
+            <a:ext cx="2971800" cy="458787"/>
+          </a:xfrm>
+          <a:prstGeom prst="rect">
+            <a:avLst/>
+          </a:prstGeom>
+        </p:spPr>
+        <p:txBody>
+          <a:bodyPr vert="horz" lIns="91440" tIns="45720" rIns="91440" bIns="45720" rtlCol="0" anchor="b"/>
+          <a:lstStyle>
+            <a:lvl1pPr algn="l">
+              <a:defRPr sz="1200"/>
+            </a:lvl1pPr>
+          </a:lstStyle>
+          <a:p>
+            <a:endParaRPr lang="en-US"/>
+          </a:p>
+        </p:txBody>
+      </p:sp>
+      <p:sp>
+        <p:nvSpPr>
+          <p:cNvPr id="7" name="Slide Number Placeholder 6"/>
+          <p:cNvSpPr>
+            <a:spLocks noGrp="1"/>
+          </p:cNvSpPr>
+          <p:nvPr>
+            <p:ph type="sldNum" sz="quarter" idx="5"/>
+          </p:nvPr>
+        </p:nvSpPr>
+        <p:spPr>
+          <a:xfrm>
+            <a:off x="3884613" y="8685213"/>
+            <a:ext cx="2971800" cy="458787"/>
+          </a:xfrm>
+          <a:prstGeom prst="rect">
+            <a:avLst/>
+          </a:prstGeom>
+        </p:spPr>
+        <p:txBody>
+          <a:bodyPr vert="horz" lIns="91440" tIns="45720" rIns="91440" bIns="45720" rtlCol="0" anchor="b"/>
+          <a:lstStyle>
+            <a:lvl1pPr algn="r">
+              <a:defRPr sz="1200"/>
+            </a:lvl1pPr>
+          </a:lstStyle>
+          <a:p>
+            <a:fld id="{21B2AA4F-B828-4D7C-AFD3-893933DAFCB4}" type="slidenum">
+              <a:rPr lang="en-US" smtClean="0"/>
+            </a:fld>
+            <a:endParaRPr lang="en-US"/>
+          </a:p>
+        </p:txBody>
+      </p:sp>
+    </p:spTree>
+  </p:cSld>
+  <p:clrMap bg1="lt1" tx1="dk1" bg2="lt2" tx2="dk2" accent1="accent1" accent2="accent2" accent3="accent3" accent4="accent4" accent5="accent5" accent6="accent6" hlink="hlink" folHlink="folHlink"/>
+  <p:notesStyle>
+    <a:lvl1pPr marL="0" algn="l" defTabSz="914400" rtl="0" eaLnBrk="1" latinLnBrk="0" hangingPunct="1">
+      <a:defRPr sz="1200" kern="1200">
+        <a:solidFill>
+          <a:schemeClr val="tx1"/>
+        </a:solidFill>
+        <a:latin typeface="+mn-lt"/>
+        <a:ea typeface="+mn-ea"/>
+        <a:cs typeface="+mn-cs"/>
+      </a:defRPr>
+    </a:lvl1pPr>
+    <a:lvl2pPr marL="457200" algn="l" defTabSz="914400" rtl="0" eaLnBrk="1" latinLnBrk="0" hangingPunct="1">
+      <a:defRPr sz="1200" kern="1200">
+        <a:solidFill>
+          <a:schemeClr val="tx1"/>
+        </a:solidFill>
+        <a:latin typeface="+mn-lt"/>
+        <a:ea typeface="+mn-ea"/>
+        <a:cs typeface="+mn-cs"/>
+      </a:defRPr>
+    </a:lvl2pPr>
+    <a:lvl3pPr marL="914400" algn="l" defTabSz="914400" rtl="0" eaLnBrk="1" latinLnBrk="0" hangingPunct="1">
+      <a:defRPr sz="1200" kern="1200">
+        <a:solidFill>
+          <a:schemeClr val="tx1"/>
+        </a:solidFill>
+        <a:latin typeface="+mn-lt"/>
+        <a:ea typeface="+mn-ea"/>
+        <a:cs typeface="+mn-cs"/>
+      </a:defRPr>
+    </a:lvl3pPr>
+    <a:lvl4pPr marL="1371600" algn="l" defTabSz="914400" rtl="0" eaLnBrk="1" latinLnBrk="0" hangingPunct="1">
+      <a:defRPr sz="1200" kern="1200">
+        <a:solidFill>
+          <a:schemeClr val="tx1"/>
+        </a:solidFill>
+        <a:latin typeface="+mn-lt"/>
+        <a:ea typeface="+mn-ea"/>
+        <a:cs typeface="+mn-cs"/>
+      </a:defRPr>
+    </a:lvl4pPr>
+    <a:lvl5pPr marL="1828800" algn="l" defTabSz="914400" rtl="0" eaLnBrk="1" latinLnBrk="0" hangingPunct="1">
+      <a:defRPr sz="1200" kern="1200">
+        <a:solidFill>
+          <a:schemeClr val="tx1"/>
+        </a:solidFill>
+        <a:latin typeface="+mn-lt"/>
+        <a:ea typeface="+mn-ea"/>
+        <a:cs typeface="+mn-cs"/>
+      </a:defRPr>
+    </a:lvl5pPr>
+    <a:lvl6pPr marL="2286000" algn="l" defTabSz="914400" rtl="0" eaLnBrk="1" latinLnBrk="0" hangingPunct="1">
+      <a:defRPr sz="1200" kern="1200">
+        <a:solidFill>
+          <a:schemeClr val="tx1"/>
+        </a:solidFill>
+        <a:latin typeface="+mn-lt"/>
+        <a:ea typeface="+mn-ea"/>
+        <a:cs typeface="+mn-cs"/>
+      </a:defRPr>
+    </a:lvl6pPr>
+    <a:lvl7pPr marL="2743200" algn="l" defTabSz="914400" rtl="0" eaLnBrk="1" latinLnBrk="0" hangingPunct="1">
+      <a:defRPr sz="1200" kern="1200">
+        <a:solidFill>
+          <a:schemeClr val="tx1"/>
+        </a:solidFill>
+        <a:latin typeface="+mn-lt"/>
+        <a:ea typeface="+mn-ea"/>
+        <a:cs typeface="+mn-cs"/>
+      </a:defRPr>
+    </a:lvl7pPr>
+    <a:lvl8pPr marL="3200400" algn="l" defTabSz="914400" rtl="0" eaLnBrk="1" latinLnBrk="0" hangingPunct="1">
+      <a:defRPr sz="1200" kern="1200">
+        <a:solidFill>
+          <a:schemeClr val="tx1"/>
+        </a:solidFill>
+        <a:latin typeface="+mn-lt"/>
+        <a:ea typeface="+mn-ea"/>
+        <a:cs typeface="+mn-cs"/>
+      </a:defRPr>
+    </a:lvl8pPr>
+    <a:lvl9pPr marL="3657600" algn="l" defTabSz="914400" rtl="0" eaLnBrk="1" latinLnBrk="0" hangingPunct="1">
+      <a:defRPr sz="1200" kern="1200">
+        <a:solidFill>
+          <a:schemeClr val="tx1"/>
+        </a:solidFill>
+        <a:latin typeface="+mn-lt"/>
+        <a:ea typeface="+mn-ea"/>
+        <a:cs typeface="+mn-cs"/>
+      </a:defRPr>
+    </a:lvl9pPr>
+  </p:notesStyle>
+</p:notesMaster>
+</file>
+
+<file path=ppt/notesSlides/notesSlide1.xml><?xml version="1.0" encoding="utf-8"?>
+<p:notes xmlns:a="http://schemas.openxmlformats.org/drawingml/2006/main" xmlns:r="http://schemas.openxmlformats.org/officeDocument/2006/relationships" xmlns:p="http://schemas.openxmlformats.org/presentationml/2006/main">
+  <p:cSld>
+    <p:spTree>
+      <p:nvGrpSpPr>
+        <p:cNvPr id="1" name=""/>
+        <p:cNvGrpSpPr/>
+        <p:nvPr/>
+      </p:nvGrpSpPr>
+      <p:grpSpPr/>
+      <p:sp>
+        <p:nvSpPr>
+          <p:cNvPr id="2" name="Slide Image Placeholder 1"/>
+          <p:cNvSpPr/>
+          <p:nvPr>
+            <p:ph type="sldImg" idx="2"/>
+          </p:nvPr>
+        </p:nvSpPr>
+        <p:spPr/>
+      </p:sp>
+      <p:sp>
+        <p:nvSpPr>
+          <p:cNvPr id="3" name="Text Placeholder 2"/>
+          <p:cNvSpPr/>
+          <p:nvPr>
+            <p:ph type="body" idx="3"/>
+          </p:nvPr>
+        </p:nvSpPr>
+        <p:spPr/>
+        <p:txBody>
+          <a:bodyPr/>
+          <a:p>
+            <a:endParaRPr lang="en-US"/>
+          </a:p>
+        </p:txBody>
+      </p:sp>
+    </p:spTree>
+  </p:cSld>
+  <p:clrMapOvr>
+    <a:masterClrMapping/>
+  </p:clrMapOvr>
+</p:notes>
+</file>
+
 <file path=ppt/slideLayouts/slideLayout1.xml><?xml version="1.0" encoding="utf-8"?>
 <p:sldLayout xmlns:a="http://schemas.openxmlformats.org/drawingml/2006/main" xmlns:r="http://schemas.openxmlformats.org/officeDocument/2006/relationships" xmlns:p="http://schemas.openxmlformats.org/presentationml/2006/main" type="title" preserve="1">
   <p:cSld name="Title Slide">
@@ -297,8 +698,6 @@
           <a:p>
             <a:fld id="{2BDCED8B-DA14-40C9-A4E9-3D902B493ED7}" type="datetimeFigureOut">
               <a:rPr lang="en-US" smtClean="0"/>
-              <a:pPr/>
-              <a:t>2/24/2016</a:t>
             </a:fld>
             <a:endParaRPr lang="en-US"/>
           </a:p>
@@ -340,8 +739,6 @@
           <a:p>
             <a:fld id="{96BCE49D-7E87-4BB3-AF4F-15717640D94E}" type="slidenum">
               <a:rPr lang="en-US" smtClean="0"/>
-              <a:pPr/>
-              <a:t>‹#›</a:t>
             </a:fld>
             <a:endParaRPr lang="en-US"/>
           </a:p>
@@ -415,6 +812,7 @@
               <a:rPr lang="en-US" smtClean="0"/>
               <a:t>Click to edit Master text styles</a:t>
             </a:r>
+            <a:endParaRPr lang="en-US" smtClean="0"/>
           </a:p>
           <a:p>
             <a:pPr lvl="1"/>
@@ -422,6 +820,7 @@
               <a:rPr lang="en-US" smtClean="0"/>
               <a:t>Second level</a:t>
             </a:r>
+            <a:endParaRPr lang="en-US" smtClean="0"/>
           </a:p>
           <a:p>
             <a:pPr lvl="2"/>
@@ -429,6 +828,7 @@
               <a:rPr lang="en-US" smtClean="0"/>
               <a:t>Third level</a:t>
             </a:r>
+            <a:endParaRPr lang="en-US" smtClean="0"/>
           </a:p>
           <a:p>
             <a:pPr lvl="3"/>
@@ -436,6 +836,7 @@
               <a:rPr lang="en-US" smtClean="0"/>
               <a:t>Fourth level</a:t>
             </a:r>
+            <a:endParaRPr lang="en-US" smtClean="0"/>
           </a:p>
           <a:p>
             <a:pPr lvl="4"/>
@@ -464,8 +865,6 @@
           <a:p>
             <a:fld id="{2BDCED8B-DA14-40C9-A4E9-3D902B493ED7}" type="datetimeFigureOut">
               <a:rPr lang="en-US" smtClean="0"/>
-              <a:pPr/>
-              <a:t>2/24/2016</a:t>
             </a:fld>
             <a:endParaRPr lang="en-US"/>
           </a:p>
@@ -507,8 +906,6 @@
           <a:p>
             <a:fld id="{96BCE49D-7E87-4BB3-AF4F-15717640D94E}" type="slidenum">
               <a:rPr lang="en-US" smtClean="0"/>
-              <a:pPr/>
-              <a:t>‹#›</a:t>
             </a:fld>
             <a:endParaRPr lang="en-US"/>
           </a:p>
@@ -592,6 +989,7 @@
               <a:rPr lang="en-US" smtClean="0"/>
               <a:t>Click to edit Master text styles</a:t>
             </a:r>
+            <a:endParaRPr lang="en-US" smtClean="0"/>
           </a:p>
           <a:p>
             <a:pPr lvl="1"/>
@@ -599,6 +997,7 @@
               <a:rPr lang="en-US" smtClean="0"/>
               <a:t>Second level</a:t>
             </a:r>
+            <a:endParaRPr lang="en-US" smtClean="0"/>
           </a:p>
           <a:p>
             <a:pPr lvl="2"/>
@@ -606,6 +1005,7 @@
               <a:rPr lang="en-US" smtClean="0"/>
               <a:t>Third level</a:t>
             </a:r>
+            <a:endParaRPr lang="en-US" smtClean="0"/>
           </a:p>
           <a:p>
             <a:pPr lvl="3"/>
@@ -613,6 +1013,7 @@
               <a:rPr lang="en-US" smtClean="0"/>
               <a:t>Fourth level</a:t>
             </a:r>
+            <a:endParaRPr lang="en-US" smtClean="0"/>
           </a:p>
           <a:p>
             <a:pPr lvl="4"/>
@@ -641,8 +1042,6 @@
           <a:p>
             <a:fld id="{2BDCED8B-DA14-40C9-A4E9-3D902B493ED7}" type="datetimeFigureOut">
               <a:rPr lang="en-US" smtClean="0"/>
-              <a:pPr/>
-              <a:t>2/24/2016</a:t>
             </a:fld>
             <a:endParaRPr lang="en-US"/>
           </a:p>
@@ -684,8 +1083,6 @@
           <a:p>
             <a:fld id="{96BCE49D-7E87-4BB3-AF4F-15717640D94E}" type="slidenum">
               <a:rPr lang="en-US" smtClean="0"/>
-              <a:pPr/>
-              <a:t>‹#›</a:t>
             </a:fld>
             <a:endParaRPr lang="en-US"/>
           </a:p>
@@ -759,6 +1156,7 @@
               <a:rPr lang="en-US" smtClean="0"/>
               <a:t>Click to edit Master text styles</a:t>
             </a:r>
+            <a:endParaRPr lang="en-US" smtClean="0"/>
           </a:p>
           <a:p>
             <a:pPr lvl="1"/>
@@ -766,6 +1164,7 @@
               <a:rPr lang="en-US" smtClean="0"/>
               <a:t>Second level</a:t>
             </a:r>
+            <a:endParaRPr lang="en-US" smtClean="0"/>
           </a:p>
           <a:p>
             <a:pPr lvl="2"/>
@@ -773,6 +1172,7 @@
               <a:rPr lang="en-US" smtClean="0"/>
               <a:t>Third level</a:t>
             </a:r>
+            <a:endParaRPr lang="en-US" smtClean="0"/>
           </a:p>
           <a:p>
             <a:pPr lvl="3"/>
@@ -780,6 +1180,7 @@
               <a:rPr lang="en-US" smtClean="0"/>
               <a:t>Fourth level</a:t>
             </a:r>
+            <a:endParaRPr lang="en-US" smtClean="0"/>
           </a:p>
           <a:p>
             <a:pPr lvl="4"/>
@@ -808,8 +1209,6 @@
           <a:p>
             <a:fld id="{2BDCED8B-DA14-40C9-A4E9-3D902B493ED7}" type="datetimeFigureOut">
               <a:rPr lang="en-US" smtClean="0"/>
-              <a:pPr/>
-              <a:t>2/24/2016</a:t>
             </a:fld>
             <a:endParaRPr lang="en-US"/>
           </a:p>
@@ -851,8 +1250,6 @@
           <a:p>
             <a:fld id="{96BCE49D-7E87-4BB3-AF4F-15717640D94E}" type="slidenum">
               <a:rPr lang="en-US" smtClean="0"/>
-              <a:pPr/>
-              <a:t>‹#›</a:t>
             </a:fld>
             <a:endParaRPr lang="en-US"/>
           </a:p>
@@ -1031,6 +1428,7 @@
               <a:rPr lang="en-US" smtClean="0"/>
               <a:t>Click to edit Master text styles</a:t>
             </a:r>
+            <a:endParaRPr lang="en-US" smtClean="0"/>
           </a:p>
         </p:txBody>
       </p:sp>
@@ -1051,8 +1449,6 @@
           <a:p>
             <a:fld id="{2BDCED8B-DA14-40C9-A4E9-3D902B493ED7}" type="datetimeFigureOut">
               <a:rPr lang="en-US" smtClean="0"/>
-              <a:pPr/>
-              <a:t>2/24/2016</a:t>
             </a:fld>
             <a:endParaRPr lang="en-US"/>
           </a:p>
@@ -1094,8 +1490,6 @@
           <a:p>
             <a:fld id="{96BCE49D-7E87-4BB3-AF4F-15717640D94E}" type="slidenum">
               <a:rPr lang="en-US" smtClean="0"/>
-              <a:pPr/>
-              <a:t>‹#›</a:t>
             </a:fld>
             <a:endParaRPr lang="en-US"/>
           </a:p>
@@ -1202,6 +1596,7 @@
               <a:rPr lang="en-US" smtClean="0"/>
               <a:t>Click to edit Master text styles</a:t>
             </a:r>
+            <a:endParaRPr lang="en-US" smtClean="0"/>
           </a:p>
           <a:p>
             <a:pPr lvl="1"/>
@@ -1209,6 +1604,7 @@
               <a:rPr lang="en-US" smtClean="0"/>
               <a:t>Second level</a:t>
             </a:r>
+            <a:endParaRPr lang="en-US" smtClean="0"/>
           </a:p>
           <a:p>
             <a:pPr lvl="2"/>
@@ -1216,6 +1612,7 @@
               <a:rPr lang="en-US" smtClean="0"/>
               <a:t>Third level</a:t>
             </a:r>
+            <a:endParaRPr lang="en-US" smtClean="0"/>
           </a:p>
           <a:p>
             <a:pPr lvl="3"/>
@@ -1223,6 +1620,7 @@
               <a:rPr lang="en-US" smtClean="0"/>
               <a:t>Fourth level</a:t>
             </a:r>
+            <a:endParaRPr lang="en-US" smtClean="0"/>
           </a:p>
           <a:p>
             <a:pPr lvl="4"/>
@@ -1287,6 +1685,7 @@
               <a:rPr lang="en-US" smtClean="0"/>
               <a:t>Click to edit Master text styles</a:t>
             </a:r>
+            <a:endParaRPr lang="en-US" smtClean="0"/>
           </a:p>
           <a:p>
             <a:pPr lvl="1"/>
@@ -1294,6 +1693,7 @@
               <a:rPr lang="en-US" smtClean="0"/>
               <a:t>Second level</a:t>
             </a:r>
+            <a:endParaRPr lang="en-US" smtClean="0"/>
           </a:p>
           <a:p>
             <a:pPr lvl="2"/>
@@ -1301,6 +1701,7 @@
               <a:rPr lang="en-US" smtClean="0"/>
               <a:t>Third level</a:t>
             </a:r>
+            <a:endParaRPr lang="en-US" smtClean="0"/>
           </a:p>
           <a:p>
             <a:pPr lvl="3"/>
@@ -1308,6 +1709,7 @@
               <a:rPr lang="en-US" smtClean="0"/>
               <a:t>Fourth level</a:t>
             </a:r>
+            <a:endParaRPr lang="en-US" smtClean="0"/>
           </a:p>
           <a:p>
             <a:pPr lvl="4"/>
@@ -1336,8 +1738,6 @@
           <a:p>
             <a:fld id="{2BDCED8B-DA14-40C9-A4E9-3D902B493ED7}" type="datetimeFigureOut">
               <a:rPr lang="en-US" smtClean="0"/>
-              <a:pPr/>
-              <a:t>2/24/2016</a:t>
             </a:fld>
             <a:endParaRPr lang="en-US"/>
           </a:p>
@@ -1379,8 +1779,6 @@
           <a:p>
             <a:fld id="{96BCE49D-7E87-4BB3-AF4F-15717640D94E}" type="slidenum">
               <a:rPr lang="en-US" smtClean="0"/>
-              <a:pPr/>
-              <a:t>‹#›</a:t>
             </a:fld>
             <a:endParaRPr lang="en-US"/>
           </a:p>
@@ -1500,6 +1898,7 @@
               <a:rPr lang="en-US" smtClean="0"/>
               <a:t>Click to edit Master text styles</a:t>
             </a:r>
+            <a:endParaRPr lang="en-US" smtClean="0"/>
           </a:p>
         </p:txBody>
       </p:sp>
@@ -1556,6 +1955,7 @@
               <a:rPr lang="en-US" smtClean="0"/>
               <a:t>Click to edit Master text styles</a:t>
             </a:r>
+            <a:endParaRPr lang="en-US" smtClean="0"/>
           </a:p>
           <a:p>
             <a:pPr lvl="1"/>
@@ -1563,6 +1963,7 @@
               <a:rPr lang="en-US" smtClean="0"/>
               <a:t>Second level</a:t>
             </a:r>
+            <a:endParaRPr lang="en-US" smtClean="0"/>
           </a:p>
           <a:p>
             <a:pPr lvl="2"/>
@@ -1570,6 +1971,7 @@
               <a:rPr lang="en-US" smtClean="0"/>
               <a:t>Third level</a:t>
             </a:r>
+            <a:endParaRPr lang="en-US" smtClean="0"/>
           </a:p>
           <a:p>
             <a:pPr lvl="3"/>
@@ -1577,6 +1979,7 @@
               <a:rPr lang="en-US" smtClean="0"/>
               <a:t>Fourth level</a:t>
             </a:r>
+            <a:endParaRPr lang="en-US" smtClean="0"/>
           </a:p>
           <a:p>
             <a:pPr lvl="4"/>
@@ -1650,6 +2053,7 @@
               <a:rPr lang="en-US" smtClean="0"/>
               <a:t>Click to edit Master text styles</a:t>
             </a:r>
+            <a:endParaRPr lang="en-US" smtClean="0"/>
           </a:p>
         </p:txBody>
       </p:sp>
@@ -1706,6 +2110,7 @@
               <a:rPr lang="en-US" smtClean="0"/>
               <a:t>Click to edit Master text styles</a:t>
             </a:r>
+            <a:endParaRPr lang="en-US" smtClean="0"/>
           </a:p>
           <a:p>
             <a:pPr lvl="1"/>
@@ -1713,6 +2118,7 @@
               <a:rPr lang="en-US" smtClean="0"/>
               <a:t>Second level</a:t>
             </a:r>
+            <a:endParaRPr lang="en-US" smtClean="0"/>
           </a:p>
           <a:p>
             <a:pPr lvl="2"/>
@@ -1720,6 +2126,7 @@
               <a:rPr lang="en-US" smtClean="0"/>
               <a:t>Third level</a:t>
             </a:r>
+            <a:endParaRPr lang="en-US" smtClean="0"/>
           </a:p>
           <a:p>
             <a:pPr lvl="3"/>
@@ -1727,6 +2134,7 @@
               <a:rPr lang="en-US" smtClean="0"/>
               <a:t>Fourth level</a:t>
             </a:r>
+            <a:endParaRPr lang="en-US" smtClean="0"/>
           </a:p>
           <a:p>
             <a:pPr lvl="4"/>
@@ -1755,8 +2163,6 @@
           <a:p>
             <a:fld id="{2BDCED8B-DA14-40C9-A4E9-3D902B493ED7}" type="datetimeFigureOut">
               <a:rPr lang="en-US" smtClean="0"/>
-              <a:pPr/>
-              <a:t>2/24/2016</a:t>
             </a:fld>
             <a:endParaRPr lang="en-US"/>
           </a:p>
@@ -1798,8 +2204,6 @@
           <a:p>
             <a:fld id="{96BCE49D-7E87-4BB3-AF4F-15717640D94E}" type="slidenum">
               <a:rPr lang="en-US" smtClean="0"/>
-              <a:pPr/>
-              <a:t>‹#›</a:t>
             </a:fld>
             <a:endParaRPr lang="en-US"/>
           </a:p>
@@ -1870,8 +2274,6 @@
           <a:p>
             <a:fld id="{2BDCED8B-DA14-40C9-A4E9-3D902B493ED7}" type="datetimeFigureOut">
               <a:rPr lang="en-US" smtClean="0"/>
-              <a:pPr/>
-              <a:t>2/24/2016</a:t>
             </a:fld>
             <a:endParaRPr lang="en-US"/>
           </a:p>
@@ -1913,8 +2315,6 @@
           <a:p>
             <a:fld id="{96BCE49D-7E87-4BB3-AF4F-15717640D94E}" type="slidenum">
               <a:rPr lang="en-US" smtClean="0"/>
-              <a:pPr/>
-              <a:t>‹#›</a:t>
             </a:fld>
             <a:endParaRPr lang="en-US"/>
           </a:p>
@@ -1962,8 +2362,6 @@
           <a:p>
             <a:fld id="{2BDCED8B-DA14-40C9-A4E9-3D902B493ED7}" type="datetimeFigureOut">
               <a:rPr lang="en-US" smtClean="0"/>
-              <a:pPr/>
-              <a:t>2/24/2016</a:t>
             </a:fld>
             <a:endParaRPr lang="en-US"/>
           </a:p>
@@ -2005,8 +2403,6 @@
           <a:p>
             <a:fld id="{96BCE49D-7E87-4BB3-AF4F-15717640D94E}" type="slidenum">
               <a:rPr lang="en-US" smtClean="0"/>
-              <a:pPr/>
-              <a:t>‹#›</a:t>
             </a:fld>
             <a:endParaRPr lang="en-US"/>
           </a:p>
@@ -2122,6 +2518,7 @@
               <a:rPr lang="en-US" smtClean="0"/>
               <a:t>Click to edit Master text styles</a:t>
             </a:r>
+            <a:endParaRPr lang="en-US" smtClean="0"/>
           </a:p>
           <a:p>
             <a:pPr lvl="1"/>
@@ -2129,6 +2526,7 @@
               <a:rPr lang="en-US" smtClean="0"/>
               <a:t>Second level</a:t>
             </a:r>
+            <a:endParaRPr lang="en-US" smtClean="0"/>
           </a:p>
           <a:p>
             <a:pPr lvl="2"/>
@@ -2136,6 +2534,7 @@
               <a:rPr lang="en-US" smtClean="0"/>
               <a:t>Third level</a:t>
             </a:r>
+            <a:endParaRPr lang="en-US" smtClean="0"/>
           </a:p>
           <a:p>
             <a:pPr lvl="3"/>
@@ -2143,6 +2542,7 @@
               <a:rPr lang="en-US" smtClean="0"/>
               <a:t>Fourth level</a:t>
             </a:r>
+            <a:endParaRPr lang="en-US" smtClean="0"/>
           </a:p>
           <a:p>
             <a:pPr lvl="4"/>
@@ -2216,6 +2616,7 @@
               <a:rPr lang="en-US" smtClean="0"/>
               <a:t>Click to edit Master text styles</a:t>
             </a:r>
+            <a:endParaRPr lang="en-US" smtClean="0"/>
           </a:p>
         </p:txBody>
       </p:sp>
@@ -2236,8 +2637,6 @@
           <a:p>
             <a:fld id="{2BDCED8B-DA14-40C9-A4E9-3D902B493ED7}" type="datetimeFigureOut">
               <a:rPr lang="en-US" smtClean="0"/>
-              <a:pPr/>
-              <a:t>2/24/2016</a:t>
             </a:fld>
             <a:endParaRPr lang="en-US"/>
           </a:p>
@@ -2279,8 +2678,6 @@
           <a:p>
             <a:fld id="{96BCE49D-7E87-4BB3-AF4F-15717640D94E}" type="slidenum">
               <a:rPr lang="en-US" smtClean="0"/>
-              <a:pPr/>
-              <a:t>‹#›</a:t>
             </a:fld>
             <a:endParaRPr lang="en-US"/>
           </a:p>
@@ -2466,6 +2863,7 @@
               <a:rPr lang="en-US" smtClean="0"/>
               <a:t>Click to edit Master text styles</a:t>
             </a:r>
+            <a:endParaRPr lang="en-US" smtClean="0"/>
           </a:p>
         </p:txBody>
       </p:sp>
@@ -2486,8 +2884,6 @@
           <a:p>
             <a:fld id="{2BDCED8B-DA14-40C9-A4E9-3D902B493ED7}" type="datetimeFigureOut">
               <a:rPr lang="en-US" smtClean="0"/>
-              <a:pPr/>
-              <a:t>2/24/2016</a:t>
             </a:fld>
             <a:endParaRPr lang="en-US"/>
           </a:p>
@@ -2529,8 +2925,6 @@
           <a:p>
             <a:fld id="{96BCE49D-7E87-4BB3-AF4F-15717640D94E}" type="slidenum">
               <a:rPr lang="en-US" smtClean="0"/>
-              <a:pPr/>
-              <a:t>‹#›</a:t>
             </a:fld>
             <a:endParaRPr lang="en-US"/>
           </a:p>
@@ -2629,6 +3023,7 @@
               <a:rPr lang="en-US" smtClean="0"/>
               <a:t>Click to edit Master text styles</a:t>
             </a:r>
+            <a:endParaRPr lang="en-US" smtClean="0"/>
           </a:p>
           <a:p>
             <a:pPr lvl="1"/>
@@ -2636,6 +3031,7 @@
               <a:rPr lang="en-US" smtClean="0"/>
               <a:t>Second level</a:t>
             </a:r>
+            <a:endParaRPr lang="en-US" smtClean="0"/>
           </a:p>
           <a:p>
             <a:pPr lvl="2"/>
@@ -2643,6 +3039,7 @@
               <a:rPr lang="en-US" smtClean="0"/>
               <a:t>Third level</a:t>
             </a:r>
+            <a:endParaRPr lang="en-US" smtClean="0"/>
           </a:p>
           <a:p>
             <a:pPr lvl="3"/>
@@ -2650,6 +3047,7 @@
               <a:rPr lang="en-US" smtClean="0"/>
               <a:t>Fourth level</a:t>
             </a:r>
+            <a:endParaRPr lang="en-US" smtClean="0"/>
           </a:p>
           <a:p>
             <a:pPr lvl="4"/>
@@ -2696,8 +3094,6 @@
           <a:p>
             <a:fld id="{2BDCED8B-DA14-40C9-A4E9-3D902B493ED7}" type="datetimeFigureOut">
               <a:rPr lang="en-US" smtClean="0"/>
-              <a:pPr/>
-              <a:t>2/24/2016</a:t>
             </a:fld>
             <a:endParaRPr lang="en-US"/>
           </a:p>
@@ -2775,8 +3171,6 @@
           <a:p>
             <a:fld id="{96BCE49D-7E87-4BB3-AF4F-15717640D94E}" type="slidenum">
               <a:rPr lang="en-US" smtClean="0"/>
-              <a:pPr/>
-              <a:t>‹#›</a:t>
             </a:fld>
             <a:endParaRPr lang="en-US"/>
           </a:p>
@@ -2820,7 +3214,7 @@
         <a:spcBef>
           <a:spcPct val="20000"/>
         </a:spcBef>
-        <a:buFont typeface="Arial" pitchFamily="34" charset="0"/>
+        <a:buFont typeface="Arial" panose="020B0604020202020204" pitchFamily="34" charset="0"/>
         <a:buChar char="•"/>
         <a:defRPr sz="3200" kern="1200">
           <a:solidFill>
@@ -2835,7 +3229,7 @@
         <a:spcBef>
           <a:spcPct val="20000"/>
         </a:spcBef>
-        <a:buFont typeface="Arial" pitchFamily="34" charset="0"/>
+        <a:buFont typeface="Arial" panose="020B0604020202020204" pitchFamily="34" charset="0"/>
         <a:buChar char="–"/>
         <a:defRPr sz="2800" kern="1200">
           <a:solidFill>
@@ -2850,7 +3244,7 @@
         <a:spcBef>
           <a:spcPct val="20000"/>
         </a:spcBef>
-        <a:buFont typeface="Arial" pitchFamily="34" charset="0"/>
+        <a:buFont typeface="Arial" panose="020B0604020202020204" pitchFamily="34" charset="0"/>
         <a:buChar char="•"/>
         <a:defRPr sz="2400" kern="1200">
           <a:solidFill>
@@ -2865,7 +3259,7 @@
         <a:spcBef>
           <a:spcPct val="20000"/>
         </a:spcBef>
-        <a:buFont typeface="Arial" pitchFamily="34" charset="0"/>
+        <a:buFont typeface="Arial" panose="020B0604020202020204" pitchFamily="34" charset="0"/>
         <a:buChar char="–"/>
         <a:defRPr sz="2000" kern="1200">
           <a:solidFill>
@@ -2880,7 +3274,7 @@
         <a:spcBef>
           <a:spcPct val="20000"/>
         </a:spcBef>
-        <a:buFont typeface="Arial" pitchFamily="34" charset="0"/>
+        <a:buFont typeface="Arial" panose="020B0604020202020204" pitchFamily="34" charset="0"/>
         <a:buChar char="»"/>
         <a:defRPr sz="2000" kern="1200">
           <a:solidFill>
@@ -2895,7 +3289,7 @@
         <a:spcBef>
           <a:spcPct val="20000"/>
         </a:spcBef>
-        <a:buFont typeface="Arial" pitchFamily="34" charset="0"/>
+        <a:buFont typeface="Arial" panose="020B0604020202020204" pitchFamily="34" charset="0"/>
         <a:buChar char="•"/>
         <a:defRPr sz="2000" kern="1200">
           <a:solidFill>
@@ -2910,7 +3304,7 @@
         <a:spcBef>
           <a:spcPct val="20000"/>
         </a:spcBef>
-        <a:buFont typeface="Arial" pitchFamily="34" charset="0"/>
+        <a:buFont typeface="Arial" panose="020B0604020202020204" pitchFamily="34" charset="0"/>
         <a:buChar char="•"/>
         <a:defRPr sz="2000" kern="1200">
           <a:solidFill>
@@ -2925,7 +3319,7 @@
         <a:spcBef>
           <a:spcPct val="20000"/>
         </a:spcBef>
-        <a:buFont typeface="Arial" pitchFamily="34" charset="0"/>
+        <a:buFont typeface="Arial" panose="020B0604020202020204" pitchFamily="34" charset="0"/>
         <a:buChar char="•"/>
         <a:defRPr sz="2000" kern="1200">
           <a:solidFill>
@@ -2940,7 +3334,7 @@
         <a:spcBef>
           <a:spcPct val="20000"/>
         </a:spcBef>
-        <a:buFont typeface="Arial" pitchFamily="34" charset="0"/>
+        <a:buFont typeface="Arial" panose="020B0604020202020204" pitchFamily="34" charset="0"/>
         <a:buChar char="•"/>
         <a:defRPr sz="2000" kern="1200">
           <a:solidFill>
@@ -3071,9 +3465,7 @@
       <p:sp>
         <p:nvSpPr>
           <p:cNvPr id="4" name="Title 1"/>
-          <p:cNvSpPr txBox="1">
-            <a:spLocks/>
-          </p:cNvSpPr>
+          <p:cNvSpPr txBox="1"/>
           <p:nvPr/>
         </p:nvSpPr>
         <p:spPr>
@@ -3105,11 +3497,10 @@
               <a:buSzTx/>
               <a:buFontTx/>
               <a:buNone/>
-              <a:tabLst/>
               <a:defRPr/>
             </a:pPr>
             <a:r>
-              <a:rPr kumimoji="0" lang="en-US" sz="4800" b="1" i="0" u="none" strike="noStrike" kern="1200" cap="none" spc="0" normalizeH="0" baseline="0" noProof="0" dirty="0" smtClean="0">
+              <a:rPr kumimoji="0" lang="" altLang="en-US" sz="4800" b="1" i="0" u="none" strike="noStrike" kern="1200" cap="none" spc="0" normalizeH="0" baseline="0" noProof="0" dirty="0" smtClean="0">
                 <a:ln>
                   <a:noFill/>
                 </a:ln>
@@ -3126,37 +3517,32 @@
                 <a:ea typeface="+mj-ea"/>
                 <a:cs typeface="+mj-cs"/>
               </a:rPr>
-              <a:t>Title of the</a:t>
-            </a:r>
-            <a:r>
-              <a:rPr kumimoji="0" lang="en-US" sz="4800" b="1" i="0" u="none" strike="noStrike" kern="1200" cap="none" spc="0" normalizeH="0" noProof="0" dirty="0" smtClean="0">
-                <a:ln>
-                  <a:noFill/>
-                </a:ln>
-                <a:effectLst>
-                  <a:outerShdw blurRad="38100" dist="38100" dir="2700000" algn="tl">
-                    <a:srgbClr val="000000">
-                      <a:alpha val="43137"/>
-                    </a:srgbClr>
-                  </a:outerShdw>
-                </a:effectLst>
-                <a:uLnTx/>
-                <a:uFillTx/>
-                <a:latin typeface="Lucida Bright" pitchFamily="18" charset="0"/>
-                <a:ea typeface="+mj-ea"/>
-                <a:cs typeface="+mj-cs"/>
-              </a:rPr>
-              <a:t> Project</a:t>
-            </a:r>
+              <a:t>Image Steganography</a:t>
+            </a:r>
+            <a:endParaRPr kumimoji="0" lang="" altLang="en-US" sz="4800" b="1" i="0" u="none" strike="noStrike" kern="1200" cap="none" spc="0" normalizeH="0" noProof="0" dirty="0" smtClean="0">
+              <a:ln>
+                <a:noFill/>
+              </a:ln>
+              <a:effectLst>
+                <a:outerShdw blurRad="38100" dist="38100" dir="2700000" algn="tl">
+                  <a:srgbClr val="000000">
+                    <a:alpha val="43137"/>
+                  </a:srgbClr>
+                </a:outerShdw>
+              </a:effectLst>
+              <a:uLnTx/>
+              <a:uFillTx/>
+              <a:latin typeface="Lucida Bright" pitchFamily="18" charset="0"/>
+              <a:ea typeface="+mj-ea"/>
+              <a:cs typeface="+mj-cs"/>
+            </a:endParaRPr>
           </a:p>
         </p:txBody>
       </p:sp>
       <p:sp>
         <p:nvSpPr>
           <p:cNvPr id="5" name="Subtitle 2"/>
-          <p:cNvSpPr txBox="1">
-            <a:spLocks/>
-          </p:cNvSpPr>
+          <p:cNvSpPr txBox="1"/>
           <p:nvPr/>
         </p:nvSpPr>
         <p:spPr>
@@ -3189,7 +3575,7 @@
                   </a:outerShdw>
                 </a:effectLst>
                 <a:latin typeface="Lucida Bright" pitchFamily="18" charset="0"/>
-                <a:sym typeface="Wingdings 3"/>
+                <a:sym typeface="Wingdings 3" panose="05040102010807070707"/>
               </a:rPr>
               <a:t>E</a:t>
             </a:r>
@@ -3203,7 +3589,7 @@
                   </a:outerShdw>
                 </a:effectLst>
                 <a:latin typeface="Lucida Bright" pitchFamily="18" charset="0"/>
-                <a:sym typeface="Wingdings 3"/>
+                <a:sym typeface="Wingdings 3" panose="05040102010807070707"/>
               </a:rPr>
               <a:t>uropean </a:t>
             </a:r>
@@ -3217,7 +3603,7 @@
                   </a:outerShdw>
                 </a:effectLst>
                 <a:latin typeface="Lucida Bright" pitchFamily="18" charset="0"/>
-                <a:sym typeface="Wingdings 3"/>
+                <a:sym typeface="Wingdings 3" panose="05040102010807070707"/>
               </a:rPr>
               <a:t>U</a:t>
             </a:r>
@@ -3231,7 +3617,7 @@
                   </a:outerShdw>
                 </a:effectLst>
                 <a:latin typeface="Lucida Bright" pitchFamily="18" charset="0"/>
-                <a:sym typeface="Wingdings 3"/>
+                <a:sym typeface="Wingdings 3" panose="05040102010807070707"/>
               </a:rPr>
               <a:t>niversity of </a:t>
             </a:r>
@@ -3245,7 +3631,7 @@
                   </a:outerShdw>
                 </a:effectLst>
                 <a:latin typeface="Lucida Bright" pitchFamily="18" charset="0"/>
-                <a:sym typeface="Wingdings 3"/>
+                <a:sym typeface="Wingdings 3" panose="05040102010807070707"/>
               </a:rPr>
               <a:t>L</a:t>
             </a:r>
@@ -3259,7 +3645,7 @@
                   </a:outerShdw>
                 </a:effectLst>
                 <a:latin typeface="Lucida Bright" pitchFamily="18" charset="0"/>
-                <a:sym typeface="Wingdings 3"/>
+                <a:sym typeface="Wingdings 3" panose="05040102010807070707"/>
               </a:rPr>
               <a:t>efke</a:t>
             </a:r>
@@ -3272,7 +3658,7 @@
                 </a:outerShdw>
               </a:effectLst>
               <a:latin typeface="Lucida Bright" pitchFamily="18" charset="0"/>
-              <a:sym typeface="Wingdings 3"/>
+              <a:sym typeface="Wingdings 3" panose="05040102010807070707"/>
             </a:endParaRPr>
           </a:p>
           <a:p>
@@ -3305,33 +3691,7 @@
                 </a:effectLst>
                 <a:latin typeface="Lucida Bright" pitchFamily="18" charset="0"/>
               </a:rPr>
-              <a:t>of </a:t>
-            </a:r>
-            <a:r>
-              <a:rPr lang="en-US" sz="2400" dirty="0" smtClean="0">
-                <a:effectLst>
-                  <a:outerShdw blurRad="38100" dist="38100" dir="2700000" algn="tl">
-                    <a:srgbClr val="000000">
-                      <a:alpha val="43137"/>
-                    </a:srgbClr>
-                  </a:outerShdw>
-                </a:effectLst>
-                <a:latin typeface="Lucida Bright" pitchFamily="18" charset="0"/>
-              </a:rPr>
-              <a:t>Computer </a:t>
-            </a:r>
-            <a:r>
-              <a:rPr lang="en-US" sz="2400" dirty="0" smtClean="0">
-                <a:effectLst>
-                  <a:outerShdw blurRad="38100" dist="38100" dir="2700000" algn="tl">
-                    <a:srgbClr val="000000">
-                      <a:alpha val="43137"/>
-                    </a:srgbClr>
-                  </a:outerShdw>
-                </a:effectLst>
-                <a:latin typeface="Lucida Bright" pitchFamily="18" charset="0"/>
-              </a:rPr>
-              <a:t>Engineering</a:t>
+              <a:t>of Computer Engineering</a:t>
             </a:r>
             <a:endParaRPr kumimoji="0" lang="en-US" sz="2400" b="0" i="0" u="none" strike="noStrike" kern="1200" cap="none" spc="0" normalizeH="0" baseline="0" noProof="0" dirty="0" smtClean="0">
               <a:ln>
@@ -3361,8 +3721,8 @@
         </p:nvSpPr>
         <p:spPr>
           <a:xfrm>
-            <a:off x="2879878" y="2840358"/>
-            <a:ext cx="3384261" cy="634020"/>
+            <a:off x="3058486" y="2840358"/>
+            <a:ext cx="3027045" cy="632460"/>
           </a:xfrm>
           <a:prstGeom prst="rect">
             <a:avLst/>
@@ -3393,6 +3753,16 @@
               </a:rPr>
               <a:t>Graduation Project Presentation</a:t>
             </a:r>
+            <a:endParaRPr lang="en-US" sz="1600" dirty="0" smtClean="0">
+              <a:effectLst>
+                <a:outerShdw blurRad="38100" dist="38100" dir="2700000" algn="tl">
+                  <a:srgbClr val="000000">
+                    <a:alpha val="43137"/>
+                  </a:srgbClr>
+                </a:outerShdw>
+              </a:effectLst>
+              <a:latin typeface="Century Gothic" pitchFamily="34" charset="0"/>
+            </a:endParaRPr>
           </a:p>
           <a:p>
             <a:pPr marL="342900" lvl="0" indent="-342900" algn="ctr">
@@ -3412,7 +3782,59 @@
                 </a:effectLst>
                 <a:latin typeface="Century Gothic" pitchFamily="34" charset="0"/>
               </a:rPr>
-              <a:t>2012-2013  Spring</a:t>
+              <a:t>201</a:t>
+            </a:r>
+            <a:r>
+              <a:rPr lang="" altLang="en-US" sz="1600" dirty="0" smtClean="0">
+                <a:effectLst>
+                  <a:outerShdw blurRad="38100" dist="38100" dir="2700000" algn="tl">
+                    <a:srgbClr val="000000">
+                      <a:alpha val="43137"/>
+                    </a:srgbClr>
+                  </a:outerShdw>
+                </a:effectLst>
+                <a:latin typeface="Century Gothic" pitchFamily="34" charset="0"/>
+              </a:rPr>
+              <a:t>9</a:t>
+            </a:r>
+            <a:r>
+              <a:rPr lang="en-US" sz="1600" dirty="0" smtClean="0">
+                <a:effectLst>
+                  <a:outerShdw blurRad="38100" dist="38100" dir="2700000" algn="tl">
+                    <a:srgbClr val="000000">
+                      <a:alpha val="43137"/>
+                    </a:srgbClr>
+                  </a:outerShdw>
+                </a:effectLst>
+                <a:latin typeface="Century Gothic" pitchFamily="34" charset="0"/>
+              </a:rPr>
+              <a:t>-20</a:t>
+            </a:r>
+            <a:r>
+              <a:rPr lang="" altLang="en-US" sz="1600" dirty="0" smtClean="0">
+                <a:effectLst>
+                  <a:outerShdw blurRad="38100" dist="38100" dir="2700000" algn="tl">
+                    <a:srgbClr val="000000">
+                      <a:alpha val="43137"/>
+                    </a:srgbClr>
+                  </a:outerShdw>
+                </a:effectLst>
+                <a:latin typeface="Century Gothic" pitchFamily="34" charset="0"/>
+              </a:rPr>
+              <a:t>20</a:t>
+            </a:r>
+            <a:r>
+              <a:rPr lang="en-US" sz="1600" dirty="0" smtClean="0">
+                <a:effectLst>
+                  <a:outerShdw blurRad="38100" dist="38100" dir="2700000" algn="tl">
+                    <a:srgbClr val="000000">
+                      <a:alpha val="43137"/>
+                    </a:srgbClr>
+                  </a:outerShdw>
+                </a:effectLst>
+                <a:latin typeface="Century Gothic" pitchFamily="34" charset="0"/>
+              </a:rPr>
+              <a:t>  Spring</a:t>
             </a:r>
             <a:endParaRPr lang="tr-TR" sz="1600" dirty="0">
               <a:effectLst>
@@ -3436,7 +3858,7 @@
           <p:nvPr/>
         </p:nvPicPr>
         <p:blipFill>
-          <a:blip r:embed="rId2" r:link="rId3" cstate="print"/>
+          <a:blip r:embed="rId1" r:link="rId2" cstate="print"/>
           <a:stretch>
             <a:fillRect/>
           </a:stretch>
@@ -3464,7 +3886,7 @@
         <p:spPr>
           <a:xfrm>
             <a:off x="2082230" y="6172200"/>
-            <a:ext cx="5007136" cy="338554"/>
+            <a:ext cx="5007136" cy="337185"/>
           </a:xfrm>
           <a:prstGeom prst="rect">
             <a:avLst/>
@@ -3481,10 +3903,23 @@
                 <a:spcPct val="20000"/>
               </a:spcBef>
               <a:tabLst>
-                <a:tab pos="1027113" algn="l"/>
+                <a:tab pos="1026795" algn="l"/>
               </a:tabLst>
               <a:defRPr/>
             </a:pPr>
+            <a:r>
+              <a:rPr lang="" altLang="en-US" sz="1600" dirty="0" smtClean="0">
+                <a:effectLst>
+                  <a:outerShdw blurRad="38100" dist="38100" dir="2700000" algn="tl">
+                    <a:srgbClr val="000000">
+                      <a:alpha val="43137"/>
+                    </a:srgbClr>
+                  </a:outerShdw>
+                </a:effectLst>
+                <a:latin typeface="Century Gothic" pitchFamily="34" charset="0"/>
+              </a:rPr>
+              <a:t>Advisor :	</a:t>
+            </a:r>
             <a:r>
               <a:rPr lang="en-US" sz="1600" dirty="0" smtClean="0">
                 <a:effectLst>
@@ -3496,7 +3931,7 @@
                 </a:effectLst>
                 <a:latin typeface="Century Gothic" pitchFamily="34" charset="0"/>
               </a:rPr>
-              <a:t>Supervisor	: </a:t>
+              <a:t> </a:t>
             </a:r>
             <a:r>
               <a:rPr lang="en-US" sz="1600" dirty="0">
@@ -3509,10 +3944,44 @@
                 </a:effectLst>
                 <a:latin typeface="Century Gothic" pitchFamily="34" charset="0"/>
               </a:rPr>
-              <a:t>Professor Emeritus </a:t>
-            </a:r>
-            <a:r>
-              <a:rPr lang="en-US" sz="1600" dirty="0" smtClean="0">
+              <a:t>Assist. Prof. Dr. Cem B. Kalyoncu</a:t>
+            </a:r>
+            <a:endParaRPr lang="en-US" sz="1600" dirty="0">
+              <a:effectLst>
+                <a:outerShdw blurRad="38100" dist="38100" dir="2700000" algn="tl">
+                  <a:srgbClr val="000000">
+                    <a:alpha val="43137"/>
+                  </a:srgbClr>
+                </a:outerShdw>
+              </a:effectLst>
+              <a:latin typeface="Century Gothic" pitchFamily="34" charset="0"/>
+            </a:endParaRPr>
+          </a:p>
+        </p:txBody>
+      </p:sp>
+      <p:sp>
+        <p:nvSpPr>
+          <p:cNvPr id="10" name="Rectangle 9"/>
+          <p:cNvSpPr/>
+          <p:nvPr/>
+        </p:nvSpPr>
+        <p:spPr>
+          <a:xfrm>
+            <a:off x="2608279" y="5140504"/>
+            <a:ext cx="4722495" cy="521970"/>
+          </a:xfrm>
+          <a:prstGeom prst="rect">
+            <a:avLst/>
+          </a:prstGeom>
+        </p:spPr>
+        <p:txBody>
+          <a:bodyPr wrap="none">
+            <a:spAutoFit/>
+          </a:bodyPr>
+          <a:lstStyle/>
+          <a:p>
+            <a:r>
+              <a:rPr lang="" altLang="en-US" sz="2800" dirty="0" smtClean="0">
                 <a:effectLst>
                   <a:outerShdw blurRad="38100" dist="38100" dir="2700000" algn="tl">
                     <a:srgbClr val="000000">
@@ -3522,9 +3991,9 @@
                 </a:effectLst>
                 <a:latin typeface="Century Gothic" pitchFamily="34" charset="0"/>
               </a:rPr>
-              <a:t>Quentin Tarantino</a:t>
-            </a:r>
-            <a:endParaRPr lang="tr-TR" sz="1600" dirty="0">
+              <a:t>Emmanuel Maneswa (154409)</a:t>
+            </a:r>
+            <a:endParaRPr lang="" altLang="en-US" sz="2800" dirty="0" smtClean="0">
               <a:effectLst>
                 <a:outerShdw blurRad="38100" dist="38100" dir="2700000" algn="tl">
                   <a:srgbClr val="000000">
@@ -3532,46 +4001,6 @@
                   </a:srgbClr>
                 </a:outerShdw>
               </a:effectLst>
-              <a:latin typeface="Century Gothic" pitchFamily="34" charset="0"/>
-            </a:endParaRPr>
-          </a:p>
-        </p:txBody>
-      </p:sp>
-      <p:sp>
-        <p:nvSpPr>
-          <p:cNvPr id="10" name="Rectangle 9"/>
-          <p:cNvSpPr/>
-          <p:nvPr/>
-        </p:nvSpPr>
-        <p:spPr>
-          <a:xfrm>
-            <a:off x="2608279" y="5140504"/>
-            <a:ext cx="3966150" cy="523220"/>
-          </a:xfrm>
-          <a:prstGeom prst="rect">
-            <a:avLst/>
-          </a:prstGeom>
-        </p:spPr>
-        <p:txBody>
-          <a:bodyPr wrap="none">
-            <a:spAutoFit/>
-          </a:bodyPr>
-          <a:lstStyle/>
-          <a:p>
-            <a:r>
-              <a:rPr lang="en-US" sz="2800" dirty="0" smtClean="0">
-                <a:effectLst>
-                  <a:outerShdw blurRad="38100" dist="38100" dir="2700000" algn="tl">
-                    <a:srgbClr val="000000">
-                      <a:alpha val="43137"/>
-                    </a:srgbClr>
-                  </a:outerShdw>
-                </a:effectLst>
-                <a:latin typeface="Century Gothic" pitchFamily="34" charset="0"/>
-              </a:rPr>
-              <a:t>John Travolta (28xxxx)</a:t>
-            </a:r>
-            <a:endParaRPr lang="en-US" sz="2800" dirty="0">
               <a:latin typeface="Century Gothic" pitchFamily="34" charset="0"/>
             </a:endParaRPr>
           </a:p>
@@ -3601,14 +4030,7 @@
         <p:cNvGrpSpPr/>
         <p:nvPr/>
       </p:nvGrpSpPr>
-      <p:grpSpPr>
-        <a:xfrm>
-          <a:off x="0" y="0"/>
-          <a:ext cx="0" cy="0"/>
-          <a:chOff x="0" y="0"/>
-          <a:chExt cx="0" cy="0"/>
-        </a:xfrm>
-      </p:grpSpPr>
+      <p:grpSpPr/>
       <p:sp>
         <p:nvSpPr>
           <p:cNvPr id="2" name="Title 1"/>
@@ -3621,56 +4043,58 @@
         </p:nvSpPr>
         <p:spPr/>
         <p:txBody>
-          <a:bodyPr/>
-          <a:lstStyle/>
+          <a:bodyPr>
+            <a:normAutofit/>
+          </a:bodyPr>
           <a:p>
             <a:pPr algn="l"/>
             <a:r>
-              <a:rPr lang="en-US" dirty="0" smtClean="0"/>
-              <a:t>Emergency slides (optional)</a:t>
-            </a:r>
-            <a:endParaRPr lang="en-US" dirty="0"/>
-          </a:p>
-        </p:txBody>
-      </p:sp>
-      <p:sp>
-        <p:nvSpPr>
-          <p:cNvPr id="3" name="Content Placeholder 2"/>
-          <p:cNvSpPr>
-            <a:spLocks noGrp="1"/>
-          </p:cNvSpPr>
-          <p:nvPr>
-            <p:ph idx="1"/>
-          </p:nvPr>
-        </p:nvSpPr>
-        <p:spPr/>
-        <p:txBody>
-          <a:bodyPr/>
-          <a:lstStyle/>
-          <a:p>
-            <a:r>
-              <a:rPr lang="en-US" dirty="0" smtClean="0"/>
-              <a:t>In case, you need to show extra information or detailed work, then you can jump to here! </a:t>
-            </a:r>
-            <a:endParaRPr lang="en-US" dirty="0"/>
-          </a:p>
-        </p:txBody>
-      </p:sp>
-      <p:sp>
-        <p:nvSpPr>
-          <p:cNvPr id="4" name="Rectangle 3"/>
-          <p:cNvSpPr/>
+              <a:rPr lang="" altLang="en-US"/>
+              <a:t>Work Done (Cont.) embeding</a:t>
+            </a:r>
+            <a:endParaRPr lang="" altLang="en-US"/>
+          </a:p>
+        </p:txBody>
+      </p:sp>
+      <p:pic>
+        <p:nvPicPr>
+          <p:cNvPr id="4" name="Picture 3" descr="secret info embedding flowchart"/>
+          <p:cNvPicPr>
+            <a:picLocks noChangeAspect="1"/>
+          </p:cNvPicPr>
           <p:nvPr/>
-        </p:nvSpPr>
+        </p:nvPicPr>
+        <p:blipFill>
+          <a:blip r:embed="rId1"/>
+          <a:stretch>
+            <a:fillRect/>
+          </a:stretch>
+        </p:blipFill>
         <p:spPr>
           <a:xfrm>
-            <a:off x="3200400" y="6474023"/>
-            <a:ext cx="2667000" cy="307777"/>
+            <a:off x="1203960" y="1274445"/>
+            <a:ext cx="6736080" cy="5088890"/>
           </a:xfrm>
           <a:prstGeom prst="rect">
             <a:avLst/>
           </a:prstGeom>
         </p:spPr>
+      </p:pic>
+      <p:sp>
+        <p:nvSpPr>
+          <p:cNvPr id="5" name="Rectangle 4"/>
+          <p:cNvSpPr/>
+          <p:nvPr/>
+        </p:nvSpPr>
+        <p:spPr>
+          <a:xfrm>
+            <a:off x="3200400" y="6474023"/>
+            <a:ext cx="2667000" cy="306705"/>
+          </a:xfrm>
+          <a:prstGeom prst="rect">
+            <a:avLst/>
+          </a:prstGeom>
+        </p:spPr>
         <p:txBody>
           <a:bodyPr wrap="square">
             <a:spAutoFit/>
@@ -3682,12 +4106,12 @@
                 <a:spcPct val="20000"/>
               </a:spcBef>
               <a:tabLst>
-                <a:tab pos="1027113" algn="l"/>
+                <a:tab pos="1026795" algn="l"/>
               </a:tabLst>
               <a:defRPr/>
             </a:pPr>
             <a:r>
-              <a:rPr lang="en-US" sz="1400" dirty="0" smtClean="0">
+              <a:rPr lang="en-US" altLang="en-US" sz="1400" dirty="0" smtClean="0">
                 <a:effectLst>
                   <a:outerShdw blurRad="38100" dist="38100" dir="2700000" algn="tl">
                     <a:srgbClr val="000000">
@@ -3697,9 +4121,9 @@
                 </a:effectLst>
                 <a:latin typeface="Century Gothic" pitchFamily="34" charset="0"/>
               </a:rPr>
-              <a:t>Title of the project</a:t>
-            </a:r>
-            <a:endParaRPr lang="tr-TR" sz="1400" dirty="0">
+              <a:t>Image Steganography</a:t>
+            </a:r>
+            <a:endParaRPr lang="en-US" altLang="en-US" sz="1400" dirty="0" smtClean="0">
               <a:effectLst>
                 <a:outerShdw blurRad="38100" dist="38100" dir="2700000" algn="tl">
                   <a:srgbClr val="000000">
@@ -3712,12 +4136,552 @@
           </a:p>
         </p:txBody>
       </p:sp>
+    </p:spTree>
+  </p:cSld>
+  <p:clrMapOvr>
+    <a:masterClrMapping/>
+  </p:clrMapOvr>
+</p:sld>
+</file>
+
+<file path=ppt/slides/slide11.xml><?xml version="1.0" encoding="utf-8"?>
+<p:sld xmlns:a="http://schemas.openxmlformats.org/drawingml/2006/main" xmlns:r="http://schemas.openxmlformats.org/officeDocument/2006/relationships" xmlns:p="http://schemas.openxmlformats.org/presentationml/2006/main">
+  <p:cSld>
+    <p:spTree>
+      <p:nvGrpSpPr>
+        <p:cNvPr id="1" name=""/>
+        <p:cNvGrpSpPr/>
+        <p:nvPr/>
+      </p:nvGrpSpPr>
+      <p:grpSpPr/>
+      <p:sp>
+        <p:nvSpPr>
+          <p:cNvPr id="2" name="Title 1"/>
+          <p:cNvSpPr>
+            <a:spLocks noGrp="1"/>
+          </p:cNvSpPr>
+          <p:nvPr>
+            <p:ph type="title"/>
+          </p:nvPr>
+        </p:nvSpPr>
+        <p:spPr/>
+        <p:txBody>
+          <a:bodyPr/>
+          <a:p>
+            <a:pPr algn="l"/>
+            <a:r>
+              <a:rPr lang="" altLang="en-US"/>
+              <a:t>Work Done (Cont.)</a:t>
+            </a:r>
+            <a:endParaRPr lang="" altLang="en-US"/>
+          </a:p>
+        </p:txBody>
+      </p:sp>
+      <p:sp>
+        <p:nvSpPr>
+          <p:cNvPr id="3" name="Content Placeholder 2"/>
+          <p:cNvSpPr>
+            <a:spLocks noGrp="1"/>
+          </p:cNvSpPr>
+          <p:nvPr>
+            <p:ph idx="1"/>
+          </p:nvPr>
+        </p:nvSpPr>
+        <p:spPr/>
+        <p:txBody>
+          <a:bodyPr/>
+          <a:p>
+            <a:r>
+              <a:rPr lang="" altLang="en-US"/>
+              <a:t>For the extraction technique the reverse of the process is needed.</a:t>
+            </a:r>
+            <a:endParaRPr lang="" altLang="en-US"/>
+          </a:p>
+        </p:txBody>
+      </p:sp>
+      <p:pic>
+        <p:nvPicPr>
+          <p:cNvPr id="4" name="Picture 3" descr="bit extraction procedure"/>
+          <p:cNvPicPr>
+            <a:picLocks noChangeAspect="1"/>
+          </p:cNvPicPr>
+          <p:nvPr/>
+        </p:nvPicPr>
+        <p:blipFill>
+          <a:blip r:embed="rId1"/>
+          <a:stretch>
+            <a:fillRect/>
+          </a:stretch>
+        </p:blipFill>
+        <p:spPr>
+          <a:xfrm>
+            <a:off x="2254885" y="2648585"/>
+            <a:ext cx="4634865" cy="3692525"/>
+          </a:xfrm>
+          <a:prstGeom prst="rect">
+            <a:avLst/>
+          </a:prstGeom>
+        </p:spPr>
+      </p:pic>
+      <p:sp>
+        <p:nvSpPr>
+          <p:cNvPr id="5" name="Rectangle 4"/>
+          <p:cNvSpPr/>
+          <p:nvPr/>
+        </p:nvSpPr>
+        <p:spPr>
+          <a:xfrm>
+            <a:off x="3200400" y="6474023"/>
+            <a:ext cx="2667000" cy="306705"/>
+          </a:xfrm>
+          <a:prstGeom prst="rect">
+            <a:avLst/>
+          </a:prstGeom>
+        </p:spPr>
+        <p:txBody>
+          <a:bodyPr wrap="square">
+            <a:spAutoFit/>
+          </a:bodyPr>
+          <a:lstStyle/>
+          <a:p>
+            <a:pPr lvl="0" algn="ctr">
+              <a:spcBef>
+                <a:spcPct val="20000"/>
+              </a:spcBef>
+              <a:tabLst>
+                <a:tab pos="1026795" algn="l"/>
+              </a:tabLst>
+              <a:defRPr/>
+            </a:pPr>
+            <a:r>
+              <a:rPr lang="en-US" altLang="en-US" sz="1400" dirty="0" smtClean="0">
+                <a:effectLst>
+                  <a:outerShdw blurRad="38100" dist="38100" dir="2700000" algn="tl">
+                    <a:srgbClr val="000000">
+                      <a:alpha val="43137"/>
+                    </a:srgbClr>
+                  </a:outerShdw>
+                </a:effectLst>
+                <a:latin typeface="Century Gothic" pitchFamily="34" charset="0"/>
+              </a:rPr>
+              <a:t>Image Steganography</a:t>
+            </a:r>
+            <a:endParaRPr lang="en-US" altLang="en-US" sz="1400" dirty="0" smtClean="0">
+              <a:effectLst>
+                <a:outerShdw blurRad="38100" dist="38100" dir="2700000" algn="tl">
+                  <a:srgbClr val="000000">
+                    <a:alpha val="43137"/>
+                  </a:srgbClr>
+                </a:outerShdw>
+              </a:effectLst>
+              <a:latin typeface="Century Gothic" pitchFamily="34" charset="0"/>
+            </a:endParaRPr>
+          </a:p>
+        </p:txBody>
+      </p:sp>
+    </p:spTree>
+  </p:cSld>
+  <p:clrMapOvr>
+    <a:masterClrMapping/>
+  </p:clrMapOvr>
+</p:sld>
+</file>
+
+<file path=ppt/slides/slide12.xml><?xml version="1.0" encoding="utf-8"?>
+<p:sld xmlns:a="http://schemas.openxmlformats.org/drawingml/2006/main" xmlns:r="http://schemas.openxmlformats.org/officeDocument/2006/relationships" xmlns:p="http://schemas.openxmlformats.org/presentationml/2006/main">
+  <p:cSld>
+    <p:spTree>
+      <p:nvGrpSpPr>
+        <p:cNvPr id="1" name=""/>
+        <p:cNvGrpSpPr/>
+        <p:nvPr/>
+      </p:nvGrpSpPr>
+      <p:grpSpPr/>
+      <p:sp>
+        <p:nvSpPr>
+          <p:cNvPr id="2" name="Title 1"/>
+          <p:cNvSpPr>
+            <a:spLocks noGrp="1"/>
+          </p:cNvSpPr>
+          <p:nvPr>
+            <p:ph type="title"/>
+          </p:nvPr>
+        </p:nvSpPr>
+        <p:spPr/>
+        <p:txBody>
+          <a:bodyPr/>
+          <a:p>
+            <a:pPr algn="l"/>
+            <a:r>
+              <a:rPr lang="" altLang="en-US"/>
+              <a:t>Work Done (Cont.) Extraction</a:t>
+            </a:r>
+            <a:endParaRPr lang="" altLang="en-US"/>
+          </a:p>
+        </p:txBody>
+      </p:sp>
+      <p:pic>
+        <p:nvPicPr>
+          <p:cNvPr id="4" name="Content Placeholder 3" descr="secret info extraction flowchart"/>
+          <p:cNvPicPr>
+            <a:picLocks noChangeAspect="1"/>
+          </p:cNvPicPr>
+          <p:nvPr>
+            <p:ph idx="1"/>
+          </p:nvPr>
+        </p:nvPicPr>
+        <p:blipFill>
+          <a:blip r:embed="rId1"/>
+          <a:stretch>
+            <a:fillRect/>
+          </a:stretch>
+        </p:blipFill>
+        <p:spPr>
+          <a:xfrm>
+            <a:off x="1271905" y="1417955"/>
+            <a:ext cx="6600190" cy="5003800"/>
+          </a:xfrm>
+          <a:prstGeom prst="rect">
+            <a:avLst/>
+          </a:prstGeom>
+        </p:spPr>
+      </p:pic>
+      <p:sp>
+        <p:nvSpPr>
+          <p:cNvPr id="5" name="Rectangle 4"/>
+          <p:cNvSpPr/>
+          <p:nvPr/>
+        </p:nvSpPr>
+        <p:spPr>
+          <a:xfrm>
+            <a:off x="3200400" y="6474023"/>
+            <a:ext cx="2667000" cy="306705"/>
+          </a:xfrm>
+          <a:prstGeom prst="rect">
+            <a:avLst/>
+          </a:prstGeom>
+        </p:spPr>
+        <p:txBody>
+          <a:bodyPr wrap="square">
+            <a:spAutoFit/>
+          </a:bodyPr>
+          <a:lstStyle/>
+          <a:p>
+            <a:pPr lvl="0" algn="ctr">
+              <a:spcBef>
+                <a:spcPct val="20000"/>
+              </a:spcBef>
+              <a:tabLst>
+                <a:tab pos="1026795" algn="l"/>
+              </a:tabLst>
+              <a:defRPr/>
+            </a:pPr>
+            <a:r>
+              <a:rPr lang="en-US" altLang="en-US" sz="1400" dirty="0" smtClean="0">
+                <a:effectLst>
+                  <a:outerShdw blurRad="38100" dist="38100" dir="2700000" algn="tl">
+                    <a:srgbClr val="000000">
+                      <a:alpha val="43137"/>
+                    </a:srgbClr>
+                  </a:outerShdw>
+                </a:effectLst>
+                <a:latin typeface="Century Gothic" pitchFamily="34" charset="0"/>
+              </a:rPr>
+              <a:t>Image Steganography</a:t>
+            </a:r>
+            <a:endParaRPr lang="en-US" altLang="en-US" sz="1400" dirty="0" smtClean="0">
+              <a:effectLst>
+                <a:outerShdw blurRad="38100" dist="38100" dir="2700000" algn="tl">
+                  <a:srgbClr val="000000">
+                    <a:alpha val="43137"/>
+                  </a:srgbClr>
+                </a:outerShdw>
+              </a:effectLst>
+              <a:latin typeface="Century Gothic" pitchFamily="34" charset="0"/>
+            </a:endParaRPr>
+          </a:p>
+        </p:txBody>
+      </p:sp>
+    </p:spTree>
+  </p:cSld>
+  <p:clrMapOvr>
+    <a:masterClrMapping/>
+  </p:clrMapOvr>
+</p:sld>
+</file>
+
+<file path=ppt/slides/slide13.xml><?xml version="1.0" encoding="utf-8"?>
+<p:sld xmlns:a="http://schemas.openxmlformats.org/drawingml/2006/main" xmlns:r="http://schemas.openxmlformats.org/officeDocument/2006/relationships" xmlns:p="http://schemas.openxmlformats.org/presentationml/2006/main">
+  <p:cSld>
+    <p:spTree>
+      <p:nvGrpSpPr>
+        <p:cNvPr id="1" name=""/>
+        <p:cNvGrpSpPr/>
+        <p:nvPr/>
+      </p:nvGrpSpPr>
+      <p:grpSpPr/>
+      <p:sp>
+        <p:nvSpPr>
+          <p:cNvPr id="2" name="Title 1"/>
+          <p:cNvSpPr>
+            <a:spLocks noGrp="1"/>
+          </p:cNvSpPr>
+          <p:nvPr>
+            <p:ph type="title"/>
+          </p:nvPr>
+        </p:nvSpPr>
+        <p:spPr/>
+        <p:txBody>
+          <a:bodyPr/>
+          <a:p>
+            <a:pPr algn="l"/>
+            <a:r>
+              <a:rPr lang="" altLang="en-US"/>
+              <a:t>Difficulties Faced</a:t>
+            </a:r>
+            <a:endParaRPr lang="" altLang="en-US"/>
+          </a:p>
+        </p:txBody>
+      </p:sp>
+      <p:sp>
+        <p:nvSpPr>
+          <p:cNvPr id="3" name="Content Placeholder 2"/>
+          <p:cNvSpPr>
+            <a:spLocks noGrp="1"/>
+          </p:cNvSpPr>
+          <p:nvPr>
+            <p:ph idx="1"/>
+          </p:nvPr>
+        </p:nvSpPr>
+        <p:spPr/>
+        <p:txBody>
+          <a:bodyPr>
+            <a:normAutofit fontScale="90000" lnSpcReduction="20000"/>
+          </a:bodyPr>
+          <a:p>
+            <a:r>
+              <a:rPr lang="" altLang="en-US"/>
+              <a:t>The main difiiculty I faced was when trying to save the changes done to the cover image in jpeg format.</a:t>
+            </a:r>
+            <a:endParaRPr lang="" altLang="en-US"/>
+          </a:p>
+          <a:p>
+            <a:r>
+              <a:rPr lang="" altLang="en-US"/>
+              <a:t>It seemed the changes did not take effect, and after adequate research I found out that some image formarts use lossy compression algorithms and jpeg is one of those image formats.</a:t>
+            </a:r>
+            <a:endParaRPr lang="" altLang="en-US"/>
+          </a:p>
+          <a:p>
+            <a:r>
+              <a:rPr lang="" altLang="en-US"/>
+              <a:t>Inorder to counter this I then chose to save the changes in png formart because it uses a loss-less compression algorithm.</a:t>
+            </a:r>
+            <a:endParaRPr lang="" altLang="en-US"/>
+          </a:p>
+          <a:p>
+            <a:endParaRPr lang="" altLang="en-US"/>
+          </a:p>
+          <a:p>
+            <a:endParaRPr lang="" altLang="en-US"/>
+          </a:p>
+        </p:txBody>
+      </p:sp>
+      <p:sp>
+        <p:nvSpPr>
+          <p:cNvPr id="4" name="Rectangle 3"/>
+          <p:cNvSpPr/>
+          <p:nvPr/>
+        </p:nvSpPr>
+        <p:spPr>
+          <a:xfrm>
+            <a:off x="3200400" y="6474023"/>
+            <a:ext cx="2667000" cy="306705"/>
+          </a:xfrm>
+          <a:prstGeom prst="rect">
+            <a:avLst/>
+          </a:prstGeom>
+        </p:spPr>
+        <p:txBody>
+          <a:bodyPr wrap="square">
+            <a:spAutoFit/>
+          </a:bodyPr>
+          <a:lstStyle/>
+          <a:p>
+            <a:pPr lvl="0" algn="ctr">
+              <a:spcBef>
+                <a:spcPct val="20000"/>
+              </a:spcBef>
+              <a:tabLst>
+                <a:tab pos="1026795" algn="l"/>
+              </a:tabLst>
+              <a:defRPr/>
+            </a:pPr>
+            <a:r>
+              <a:rPr lang="en-US" altLang="en-US" sz="1400" dirty="0" smtClean="0">
+                <a:effectLst>
+                  <a:outerShdw blurRad="38100" dist="38100" dir="2700000" algn="tl">
+                    <a:srgbClr val="000000">
+                      <a:alpha val="43137"/>
+                    </a:srgbClr>
+                  </a:outerShdw>
+                </a:effectLst>
+                <a:latin typeface="Century Gothic" pitchFamily="34" charset="0"/>
+              </a:rPr>
+              <a:t>Image Steganography</a:t>
+            </a:r>
+            <a:endParaRPr lang="en-US" altLang="en-US" sz="1400" dirty="0" smtClean="0">
+              <a:effectLst>
+                <a:outerShdw blurRad="38100" dist="38100" dir="2700000" algn="tl">
+                  <a:srgbClr val="000000">
+                    <a:alpha val="43137"/>
+                  </a:srgbClr>
+                </a:outerShdw>
+              </a:effectLst>
+              <a:latin typeface="Century Gothic" pitchFamily="34" charset="0"/>
+            </a:endParaRPr>
+          </a:p>
+        </p:txBody>
+      </p:sp>
+    </p:spTree>
+  </p:cSld>
+  <p:clrMapOvr>
+    <a:masterClrMapping/>
+  </p:clrMapOvr>
+</p:sld>
+</file>
+
+<file path=ppt/slides/slide14.xml><?xml version="1.0" encoding="utf-8"?>
+<p:sld xmlns:a="http://schemas.openxmlformats.org/drawingml/2006/main" xmlns:r="http://schemas.openxmlformats.org/officeDocument/2006/relationships" xmlns:p="http://schemas.openxmlformats.org/presentationml/2006/main">
+  <p:cSld>
+    <p:spTree>
+      <p:nvGrpSpPr>
+        <p:cNvPr id="1" name=""/>
+        <p:cNvGrpSpPr/>
+        <p:nvPr/>
+      </p:nvGrpSpPr>
+      <p:grpSpPr>
+        <a:xfrm>
+          <a:off x="0" y="0"/>
+          <a:ext cx="0" cy="0"/>
+          <a:chOff x="0" y="0"/>
+          <a:chExt cx="0" cy="0"/>
+        </a:xfrm>
+      </p:grpSpPr>
+      <p:sp>
+        <p:nvSpPr>
+          <p:cNvPr id="2" name="Title 1"/>
+          <p:cNvSpPr>
+            <a:spLocks noGrp="1"/>
+          </p:cNvSpPr>
+          <p:nvPr>
+            <p:ph type="title"/>
+          </p:nvPr>
+        </p:nvSpPr>
+        <p:spPr/>
+        <p:txBody>
+          <a:bodyPr/>
+          <a:lstStyle/>
+          <a:p>
+            <a:pPr algn="l"/>
+            <a:r>
+              <a:rPr lang="en-US" dirty="0" smtClean="0"/>
+              <a:t>Conclusions</a:t>
+            </a:r>
+            <a:endParaRPr lang="en-US" dirty="0"/>
+          </a:p>
+        </p:txBody>
+      </p:sp>
+      <p:sp>
+        <p:nvSpPr>
+          <p:cNvPr id="3" name="Content Placeholder 2"/>
+          <p:cNvSpPr>
+            <a:spLocks noGrp="1"/>
+          </p:cNvSpPr>
+          <p:nvPr>
+            <p:ph idx="1"/>
+          </p:nvPr>
+        </p:nvSpPr>
+        <p:spPr/>
+        <p:txBody>
+          <a:bodyPr/>
+          <a:lstStyle/>
+          <a:p>
+            <a:r>
+              <a:rPr lang="" altLang="en-US" dirty="0" smtClean="0"/>
+              <a:t>I managed to complete task of securely hiding sensitive text information inside images and created the desktop application.</a:t>
+            </a:r>
+            <a:endParaRPr lang="" altLang="en-US" dirty="0" smtClean="0"/>
+          </a:p>
+          <a:p>
+            <a:r>
+              <a:rPr lang="" altLang="en-US" dirty="0" smtClean="0"/>
+              <a:t>I archieved the promises I gave in COMP400.</a:t>
+            </a:r>
+            <a:endParaRPr lang="" altLang="en-US" dirty="0" smtClean="0"/>
+          </a:p>
+        </p:txBody>
+      </p:sp>
+      <p:sp>
+        <p:nvSpPr>
+          <p:cNvPr id="4" name="Rectangle 3"/>
+          <p:cNvSpPr/>
+          <p:nvPr/>
+        </p:nvSpPr>
+        <p:spPr>
+          <a:xfrm>
+            <a:off x="3200400" y="6474023"/>
+            <a:ext cx="2667000" cy="306705"/>
+          </a:xfrm>
+          <a:prstGeom prst="rect">
+            <a:avLst/>
+          </a:prstGeom>
+        </p:spPr>
+        <p:txBody>
+          <a:bodyPr wrap="square">
+            <a:spAutoFit/>
+          </a:bodyPr>
+          <a:lstStyle/>
+          <a:p>
+            <a:pPr lvl="0" algn="ctr">
+              <a:spcBef>
+                <a:spcPct val="20000"/>
+              </a:spcBef>
+              <a:tabLst>
+                <a:tab pos="1026795" algn="l"/>
+              </a:tabLst>
+              <a:defRPr/>
+            </a:pPr>
+            <a:r>
+              <a:rPr lang="" altLang="en-US" sz="1400" dirty="0" smtClean="0">
+                <a:effectLst>
+                  <a:outerShdw blurRad="38100" dist="38100" dir="2700000" algn="tl">
+                    <a:srgbClr val="000000">
+                      <a:alpha val="43137"/>
+                    </a:srgbClr>
+                  </a:outerShdw>
+                </a:effectLst>
+                <a:latin typeface="Century Gothic" pitchFamily="34" charset="0"/>
+              </a:rPr>
+              <a:t>Image Steganography</a:t>
+            </a:r>
+            <a:endParaRPr lang="" altLang="en-US" sz="1400" dirty="0" smtClean="0">
+              <a:effectLst>
+                <a:outerShdw blurRad="38100" dist="38100" dir="2700000" algn="tl">
+                  <a:srgbClr val="000000">
+                    <a:alpha val="43137"/>
+                  </a:srgbClr>
+                </a:outerShdw>
+              </a:effectLst>
+              <a:latin typeface="Century Gothic" pitchFamily="34" charset="0"/>
+            </a:endParaRPr>
+          </a:p>
+        </p:txBody>
+      </p:sp>
       <p:sp>
         <p:nvSpPr>
           <p:cNvPr id="5" name="Footer Placeholder 4"/>
-          <p:cNvSpPr txBox="1">
-            <a:spLocks/>
-          </p:cNvSpPr>
+          <p:cNvSpPr txBox="1"/>
           <p:nvPr/>
         </p:nvSpPr>
         <p:spPr>
@@ -3751,7 +4715,6 @@
               <a:buSzTx/>
               <a:buFontTx/>
               <a:buNone/>
-              <a:tabLst/>
               <a:defRPr/>
             </a:pPr>
             <a:fld id="{920BB873-19B1-47CA-9FBA-06779EDAA9C1}" type="slidenum">
@@ -3766,24 +4729,6 @@
                 <a:ea typeface="+mn-ea"/>
                 <a:cs typeface="+mn-cs"/>
               </a:rPr>
-              <a:pPr marL="0" marR="0" lvl="0" indent="0" algn="r" defTabSz="914400" rtl="0" eaLnBrk="1" fontAlgn="auto" latinLnBrk="0" hangingPunct="1">
-                <a:lnSpc>
-                  <a:spcPct val="100000"/>
-                </a:lnSpc>
-                <a:spcBef>
-                  <a:spcPts val="0"/>
-                </a:spcBef>
-                <a:spcAft>
-                  <a:spcPts val="0"/>
-                </a:spcAft>
-                <a:buClrTx/>
-                <a:buSzTx/>
-                <a:buFontTx/>
-                <a:buNone/>
-                <a:tabLst/>
-                <a:defRPr/>
-              </a:pPr>
-              <a:t>10</a:t>
             </a:fld>
             <a:endParaRPr kumimoji="0" lang="en-US" sz="1000" b="1" i="0" u="none" strike="noStrike" kern="1200" cap="none" spc="0" normalizeH="0" baseline="0" noProof="0" dirty="0">
               <a:ln>
@@ -3811,6 +4756,437 @@
       </p:par>
     </p:tnLst>
   </p:timing>
+</p:sld>
+</file>
+
+<file path=ppt/slides/slide15.xml><?xml version="1.0" encoding="utf-8"?>
+<p:sld xmlns:a="http://schemas.openxmlformats.org/drawingml/2006/main" xmlns:r="http://schemas.openxmlformats.org/officeDocument/2006/relationships" xmlns:p="http://schemas.openxmlformats.org/presentationml/2006/main">
+  <p:cSld>
+    <p:spTree>
+      <p:nvGrpSpPr>
+        <p:cNvPr id="1" name=""/>
+        <p:cNvGrpSpPr/>
+        <p:nvPr/>
+      </p:nvGrpSpPr>
+      <p:grpSpPr/>
+      <p:sp>
+        <p:nvSpPr>
+          <p:cNvPr id="2" name="Title 1"/>
+          <p:cNvSpPr>
+            <a:spLocks noGrp="1"/>
+          </p:cNvSpPr>
+          <p:nvPr>
+            <p:ph type="title"/>
+          </p:nvPr>
+        </p:nvSpPr>
+        <p:spPr/>
+        <p:txBody>
+          <a:bodyPr/>
+          <a:p>
+            <a:pPr algn="l"/>
+            <a:r>
+              <a:rPr lang="" altLang="en-US"/>
+              <a:t>What I Learnt</a:t>
+            </a:r>
+            <a:endParaRPr lang="" altLang="en-US"/>
+          </a:p>
+        </p:txBody>
+      </p:sp>
+      <p:sp>
+        <p:nvSpPr>
+          <p:cNvPr id="3" name="Content Placeholder 2"/>
+          <p:cNvSpPr>
+            <a:spLocks noGrp="1"/>
+          </p:cNvSpPr>
+          <p:nvPr>
+            <p:ph idx="1"/>
+          </p:nvPr>
+        </p:nvSpPr>
+        <p:spPr/>
+        <p:txBody>
+          <a:bodyPr/>
+          <a:p>
+            <a:r>
+              <a:rPr lang="" altLang="en-US"/>
+              <a:t>basic understanding on how image manipulation works.</a:t>
+            </a:r>
+            <a:endParaRPr lang="" altLang="en-US"/>
+          </a:p>
+          <a:p>
+            <a:r>
+              <a:rPr lang="" altLang="en-US"/>
+              <a:t>Qt and C++ integration. Since C++ does not have its own inbuilt GUI creation libraries.</a:t>
+            </a:r>
+            <a:endParaRPr lang="" altLang="en-US"/>
+          </a:p>
+          <a:p>
+            <a:endParaRPr lang="" altLang="en-US"/>
+          </a:p>
+        </p:txBody>
+      </p:sp>
+      <p:sp>
+        <p:nvSpPr>
+          <p:cNvPr id="5" name="Rectangle 4"/>
+          <p:cNvSpPr/>
+          <p:nvPr/>
+        </p:nvSpPr>
+        <p:spPr>
+          <a:xfrm>
+            <a:off x="3200400" y="6474023"/>
+            <a:ext cx="2667000" cy="306705"/>
+          </a:xfrm>
+          <a:prstGeom prst="rect">
+            <a:avLst/>
+          </a:prstGeom>
+        </p:spPr>
+        <p:txBody>
+          <a:bodyPr wrap="square">
+            <a:spAutoFit/>
+          </a:bodyPr>
+          <a:lstStyle/>
+          <a:p>
+            <a:pPr lvl="0" algn="ctr">
+              <a:spcBef>
+                <a:spcPct val="20000"/>
+              </a:spcBef>
+              <a:tabLst>
+                <a:tab pos="1026795" algn="l"/>
+              </a:tabLst>
+              <a:defRPr/>
+            </a:pPr>
+            <a:r>
+              <a:rPr lang="en-US" altLang="en-US" sz="1400" dirty="0" smtClean="0">
+                <a:effectLst>
+                  <a:outerShdw blurRad="38100" dist="38100" dir="2700000" algn="tl">
+                    <a:srgbClr val="000000">
+                      <a:alpha val="43137"/>
+                    </a:srgbClr>
+                  </a:outerShdw>
+                </a:effectLst>
+                <a:latin typeface="Century Gothic" pitchFamily="34" charset="0"/>
+              </a:rPr>
+              <a:t>Image Steganography</a:t>
+            </a:r>
+            <a:endParaRPr lang="en-US" altLang="en-US" sz="1400" dirty="0" smtClean="0">
+              <a:effectLst>
+                <a:outerShdw blurRad="38100" dist="38100" dir="2700000" algn="tl">
+                  <a:srgbClr val="000000">
+                    <a:alpha val="43137"/>
+                  </a:srgbClr>
+                </a:outerShdw>
+              </a:effectLst>
+              <a:latin typeface="Century Gothic" pitchFamily="34" charset="0"/>
+            </a:endParaRPr>
+          </a:p>
+        </p:txBody>
+      </p:sp>
+    </p:spTree>
+  </p:cSld>
+  <p:clrMapOvr>
+    <a:masterClrMapping/>
+  </p:clrMapOvr>
+</p:sld>
+</file>
+
+<file path=ppt/slides/slide16.xml><?xml version="1.0" encoding="utf-8"?>
+<p:sld xmlns:a="http://schemas.openxmlformats.org/drawingml/2006/main" xmlns:r="http://schemas.openxmlformats.org/officeDocument/2006/relationships" xmlns:p="http://schemas.openxmlformats.org/presentationml/2006/main">
+  <p:cSld>
+    <p:spTree>
+      <p:nvGrpSpPr>
+        <p:cNvPr id="1" name=""/>
+        <p:cNvGrpSpPr/>
+        <p:nvPr/>
+      </p:nvGrpSpPr>
+      <p:grpSpPr>
+        <a:xfrm>
+          <a:off x="0" y="0"/>
+          <a:ext cx="0" cy="0"/>
+          <a:chOff x="0" y="0"/>
+          <a:chExt cx="0" cy="0"/>
+        </a:xfrm>
+      </p:grpSpPr>
+      <p:sp>
+        <p:nvSpPr>
+          <p:cNvPr id="2" name="Title 1"/>
+          <p:cNvSpPr>
+            <a:spLocks noGrp="1"/>
+          </p:cNvSpPr>
+          <p:nvPr>
+            <p:ph type="title"/>
+          </p:nvPr>
+        </p:nvSpPr>
+        <p:spPr/>
+        <p:txBody>
+          <a:bodyPr/>
+          <a:lstStyle/>
+          <a:p>
+            <a:pPr algn="l"/>
+            <a:r>
+              <a:rPr lang="en-US" dirty="0" smtClean="0"/>
+              <a:t>Demonstration</a:t>
+            </a:r>
+            <a:endParaRPr lang="en-US" dirty="0"/>
+          </a:p>
+        </p:txBody>
+      </p:sp>
+      <p:sp>
+        <p:nvSpPr>
+          <p:cNvPr id="3" name="Content Placeholder 2"/>
+          <p:cNvSpPr>
+            <a:spLocks noGrp="1"/>
+          </p:cNvSpPr>
+          <p:nvPr>
+            <p:ph idx="1"/>
+          </p:nvPr>
+        </p:nvSpPr>
+        <p:spPr/>
+        <p:txBody>
+          <a:bodyPr/>
+          <a:lstStyle/>
+          <a:p>
+            <a:r>
+              <a:rPr lang="" altLang="en-US" dirty="0"/>
+              <a:t>Application Demonstration.</a:t>
+            </a:r>
+            <a:endParaRPr lang="" altLang="en-US" dirty="0"/>
+          </a:p>
+        </p:txBody>
+      </p:sp>
+      <p:sp>
+        <p:nvSpPr>
+          <p:cNvPr id="4" name="Rectangle 3"/>
+          <p:cNvSpPr/>
+          <p:nvPr/>
+        </p:nvSpPr>
+        <p:spPr>
+          <a:xfrm>
+            <a:off x="3200400" y="6474023"/>
+            <a:ext cx="2667000" cy="306705"/>
+          </a:xfrm>
+          <a:prstGeom prst="rect">
+            <a:avLst/>
+          </a:prstGeom>
+        </p:spPr>
+        <p:txBody>
+          <a:bodyPr wrap="square">
+            <a:spAutoFit/>
+          </a:bodyPr>
+          <a:lstStyle/>
+          <a:p>
+            <a:pPr lvl="0" algn="ctr">
+              <a:spcBef>
+                <a:spcPct val="20000"/>
+              </a:spcBef>
+              <a:tabLst>
+                <a:tab pos="1026795" algn="l"/>
+              </a:tabLst>
+              <a:defRPr/>
+            </a:pPr>
+            <a:r>
+              <a:rPr lang="" altLang="en-US" sz="1400" dirty="0" smtClean="0">
+                <a:effectLst>
+                  <a:outerShdw blurRad="38100" dist="38100" dir="2700000" algn="tl">
+                    <a:srgbClr val="000000">
+                      <a:alpha val="43137"/>
+                    </a:srgbClr>
+                  </a:outerShdw>
+                </a:effectLst>
+                <a:latin typeface="Century Gothic" pitchFamily="34" charset="0"/>
+              </a:rPr>
+              <a:t>Image Steganography</a:t>
+            </a:r>
+            <a:endParaRPr lang="" altLang="en-US" sz="1400" dirty="0" smtClean="0">
+              <a:effectLst>
+                <a:outerShdw blurRad="38100" dist="38100" dir="2700000" algn="tl">
+                  <a:srgbClr val="000000">
+                    <a:alpha val="43137"/>
+                  </a:srgbClr>
+                </a:outerShdw>
+              </a:effectLst>
+              <a:latin typeface="Century Gothic" pitchFamily="34" charset="0"/>
+            </a:endParaRPr>
+          </a:p>
+        </p:txBody>
+      </p:sp>
+      <p:sp>
+        <p:nvSpPr>
+          <p:cNvPr id="5" name="Footer Placeholder 4"/>
+          <p:cNvSpPr txBox="1"/>
+          <p:nvPr/>
+        </p:nvSpPr>
+        <p:spPr>
+          <a:xfrm>
+            <a:off x="8305800" y="6462444"/>
+            <a:ext cx="762000" cy="299608"/>
+          </a:xfrm>
+          <a:prstGeom prst="rect">
+            <a:avLst/>
+          </a:prstGeom>
+        </p:spPr>
+        <p:txBody>
+          <a:bodyPr vert="horz" lIns="91440" tIns="45720" rIns="91440" bIns="45720" rtlCol="0" anchor="ctr"/>
+          <a:lstStyle>
+            <a:lvl1pPr>
+              <a:defRPr sz="1200"/>
+            </a:lvl1pPr>
+          </a:lstStyle>
+          <a:p>
+            <a:pPr marL="0" marR="0" lvl="0" indent="0" algn="r" defTabSz="914400" rtl="0" eaLnBrk="1" fontAlgn="auto" latinLnBrk="0" hangingPunct="1">
+              <a:lnSpc>
+                <a:spcPct val="100000"/>
+              </a:lnSpc>
+              <a:spcBef>
+                <a:spcPts val="0"/>
+              </a:spcBef>
+              <a:spcAft>
+                <a:spcPts val="0"/>
+              </a:spcAft>
+              <a:buClrTx/>
+              <a:buSzTx/>
+              <a:buFontTx/>
+              <a:buNone/>
+              <a:defRPr/>
+            </a:pPr>
+            <a:fld id="{920BB873-19B1-47CA-9FBA-06779EDAA9C1}" type="slidenum">
+              <a:rPr kumimoji="0" lang="en-US" sz="1000" b="1" i="0" u="none" strike="noStrike" kern="1200" cap="none" spc="0" normalizeH="0" baseline="0" noProof="0" smtClean="0">
+                <a:ln>
+                  <a:noFill/>
+                </a:ln>
+                <a:effectLst/>
+                <a:uLnTx/>
+                <a:uFillTx/>
+                <a:latin typeface="Lucida Bright" pitchFamily="18" charset="0"/>
+                <a:ea typeface="+mn-ea"/>
+                <a:cs typeface="+mn-cs"/>
+              </a:rPr>
+            </a:fld>
+            <a:endParaRPr kumimoji="0" lang="en-US" sz="1000" b="1" i="0" u="none" strike="noStrike" kern="1200" cap="none" spc="0" normalizeH="0" baseline="0" noProof="0" dirty="0">
+              <a:ln>
+                <a:noFill/>
+              </a:ln>
+              <a:effectLst/>
+              <a:uLnTx/>
+              <a:uFillTx/>
+              <a:latin typeface="Lucida Bright" pitchFamily="18" charset="0"/>
+              <a:ea typeface="+mn-ea"/>
+              <a:cs typeface="+mn-cs"/>
+            </a:endParaRPr>
+          </a:p>
+        </p:txBody>
+      </p:sp>
+    </p:spTree>
+  </p:cSld>
+  <p:clrMapOvr>
+    <a:masterClrMapping/>
+  </p:clrMapOvr>
+  <p:timing>
+    <p:tnLst>
+      <p:par>
+        <p:cTn id="1" dur="indefinite" restart="never" nodeType="tmRoot"/>
+      </p:par>
+    </p:tnLst>
+  </p:timing>
+</p:sld>
+</file>
+
+<file path=ppt/slides/slide17.xml><?xml version="1.0" encoding="utf-8"?>
+<p:sld xmlns:a="http://schemas.openxmlformats.org/drawingml/2006/main" xmlns:r="http://schemas.openxmlformats.org/officeDocument/2006/relationships" xmlns:p="http://schemas.openxmlformats.org/presentationml/2006/main">
+  <p:cSld>
+    <p:spTree>
+      <p:nvGrpSpPr>
+        <p:cNvPr id="1" name=""/>
+        <p:cNvGrpSpPr/>
+        <p:nvPr/>
+      </p:nvGrpSpPr>
+      <p:grpSpPr/>
+      <p:sp>
+        <p:nvSpPr>
+          <p:cNvPr id="2" name="Title 1"/>
+          <p:cNvSpPr>
+            <a:spLocks noGrp="1"/>
+          </p:cNvSpPr>
+          <p:nvPr>
+            <p:ph type="title"/>
+          </p:nvPr>
+        </p:nvSpPr>
+        <p:spPr>
+          <a:xfrm>
+            <a:off x="457200" y="2857183"/>
+            <a:ext cx="8229600" cy="1143000"/>
+          </a:xfrm>
+        </p:spPr>
+        <p:txBody>
+          <a:bodyPr/>
+          <a:p>
+            <a:r>
+              <a:rPr lang="" altLang="en-US"/>
+              <a:t>THANK YOU</a:t>
+            </a:r>
+            <a:endParaRPr lang="" altLang="en-US"/>
+          </a:p>
+        </p:txBody>
+      </p:sp>
+      <p:sp>
+        <p:nvSpPr>
+          <p:cNvPr id="4" name="Rectangle 3"/>
+          <p:cNvSpPr/>
+          <p:nvPr/>
+        </p:nvSpPr>
+        <p:spPr>
+          <a:xfrm>
+            <a:off x="3200400" y="6474023"/>
+            <a:ext cx="2667000" cy="306705"/>
+          </a:xfrm>
+          <a:prstGeom prst="rect">
+            <a:avLst/>
+          </a:prstGeom>
+        </p:spPr>
+        <p:txBody>
+          <a:bodyPr wrap="square">
+            <a:spAutoFit/>
+          </a:bodyPr>
+          <a:lstStyle/>
+          <a:p>
+            <a:pPr lvl="0" algn="ctr">
+              <a:spcBef>
+                <a:spcPct val="20000"/>
+              </a:spcBef>
+              <a:tabLst>
+                <a:tab pos="1026795" algn="l"/>
+              </a:tabLst>
+              <a:defRPr/>
+            </a:pPr>
+            <a:r>
+              <a:rPr lang="en-US" altLang="en-US" sz="1400" dirty="0" smtClean="0">
+                <a:effectLst>
+                  <a:outerShdw blurRad="38100" dist="38100" dir="2700000" algn="tl">
+                    <a:srgbClr val="000000">
+                      <a:alpha val="43137"/>
+                    </a:srgbClr>
+                  </a:outerShdw>
+                </a:effectLst>
+                <a:latin typeface="Century Gothic" pitchFamily="34" charset="0"/>
+              </a:rPr>
+              <a:t>Image Steganography</a:t>
+            </a:r>
+            <a:endParaRPr lang="en-US" altLang="en-US" sz="1400" dirty="0" smtClean="0">
+              <a:effectLst>
+                <a:outerShdw blurRad="38100" dist="38100" dir="2700000" algn="tl">
+                  <a:srgbClr val="000000">
+                    <a:alpha val="43137"/>
+                  </a:srgbClr>
+                </a:outerShdw>
+              </a:effectLst>
+              <a:latin typeface="Century Gothic" pitchFamily="34" charset="0"/>
+            </a:endParaRPr>
+          </a:p>
+        </p:txBody>
+      </p:sp>
+    </p:spTree>
+  </p:cSld>
+  <p:clrMapOvr>
+    <a:masterClrMapping/>
+  </p:clrMapOvr>
 </p:sld>
 </file>
 
@@ -3868,7 +5244,7 @@
         <p:spPr/>
         <p:txBody>
           <a:bodyPr>
-            <a:normAutofit/>
+            <a:normAutofit lnSpcReduction="20000"/>
           </a:bodyPr>
           <a:lstStyle/>
           <a:p>
@@ -3876,41 +5252,93 @@
               <a:rPr lang="en-US" dirty="0" smtClean="0"/>
               <a:t>Introduction</a:t>
             </a:r>
-          </a:p>
-          <a:p>
+            <a:endParaRPr lang="en-US" dirty="0" smtClean="0"/>
+          </a:p>
+          <a:p>
+            <a:r>
+              <a:rPr lang="" altLang="en-US" dirty="0" smtClean="0"/>
+              <a:t>Previous Implementation</a:t>
+            </a:r>
+            <a:endParaRPr lang="en-US" dirty="0" smtClean="0"/>
+          </a:p>
+          <a:p>
+            <a:r>
+              <a:rPr lang="" altLang="en-US" dirty="0" smtClean="0"/>
+              <a:t>Project Plan/</a:t>
+            </a:r>
             <a:r>
               <a:rPr lang="en-US" dirty="0" smtClean="0"/>
-              <a:t>Problem definition</a:t>
-            </a:r>
-          </a:p>
-          <a:p>
+              <a:t>Problem </a:t>
+            </a:r>
+            <a:r>
+              <a:rPr lang="" altLang="en-US" dirty="0" smtClean="0"/>
+              <a:t>D</a:t>
+            </a:r>
             <a:r>
               <a:rPr lang="en-US" dirty="0" smtClean="0"/>
-              <a:t>Technology used</a:t>
-            </a:r>
+              <a:t>efinition</a:t>
+            </a:r>
+            <a:endParaRPr lang="en-US" dirty="0" smtClean="0"/>
           </a:p>
           <a:p>
             <a:r>
               <a:rPr lang="en-US" dirty="0" smtClean="0"/>
-              <a:t>Work done</a:t>
-            </a:r>
-          </a:p>
-          <a:p>
+              <a:t>Technology </a:t>
+            </a:r>
+            <a:r>
+              <a:rPr lang="" altLang="en-US" dirty="0" smtClean="0"/>
+              <a:t>U</a:t>
+            </a:r>
             <a:r>
               <a:rPr lang="en-US" dirty="0" smtClean="0"/>
-              <a:t>Conclusions</a:t>
-            </a:r>
+              <a:t>sed</a:t>
+            </a:r>
+            <a:endParaRPr lang="en-US" dirty="0" smtClean="0"/>
           </a:p>
           <a:p>
             <a:r>
               <a:rPr lang="en-US" dirty="0" smtClean="0"/>
-              <a:t>Future Work</a:t>
-            </a:r>
-          </a:p>
-          <a:p>
+              <a:t>Work </a:t>
+            </a:r>
+            <a:r>
+              <a:rPr lang="" altLang="en-US" dirty="0" smtClean="0"/>
+              <a:t>D</a:t>
+            </a:r>
             <a:r>
               <a:rPr lang="en-US" dirty="0" smtClean="0"/>
-              <a:t>Demonstration (!)</a:t>
+              <a:t>one</a:t>
+            </a:r>
+            <a:endParaRPr lang="en-US" dirty="0" smtClean="0"/>
+          </a:p>
+          <a:p>
+            <a:r>
+              <a:rPr lang="" altLang="en-US" dirty="0" smtClean="0"/>
+              <a:t>Difficulties Faced</a:t>
+            </a:r>
+            <a:endParaRPr lang="en-US" dirty="0" smtClean="0"/>
+          </a:p>
+          <a:p>
+            <a:r>
+              <a:rPr lang="en-US" dirty="0" smtClean="0"/>
+              <a:t>Conclusion</a:t>
+            </a:r>
+            <a:r>
+              <a:rPr lang="" altLang="en-US" dirty="0" smtClean="0"/>
+              <a:t>s</a:t>
+            </a:r>
+            <a:endParaRPr lang="en-US" dirty="0" smtClean="0"/>
+          </a:p>
+          <a:p>
+            <a:r>
+              <a:rPr lang="" altLang="en-US" dirty="0" smtClean="0"/>
+              <a:t>What I Learnt</a:t>
+            </a:r>
+            <a:endParaRPr lang="en-US" dirty="0" smtClean="0"/>
+          </a:p>
+          <a:p>
+            <a:r>
+              <a:rPr lang="en-US" dirty="0" smtClean="0"/>
+              <a:t>Demonstration</a:t>
             </a:r>
             <a:endParaRPr lang="en-US" dirty="0"/>
           </a:p>
@@ -3925,7 +5353,7 @@
         <p:spPr>
           <a:xfrm>
             <a:off x="3200400" y="6474023"/>
-            <a:ext cx="2667000" cy="307777"/>
+            <a:ext cx="2667000" cy="306705"/>
           </a:xfrm>
           <a:prstGeom prst="rect">
             <a:avLst/>
@@ -3942,12 +5370,12 @@
                 <a:spcPct val="20000"/>
               </a:spcBef>
               <a:tabLst>
-                <a:tab pos="1027113" algn="l"/>
+                <a:tab pos="1026795" algn="l"/>
               </a:tabLst>
               <a:defRPr/>
             </a:pPr>
             <a:r>
-              <a:rPr lang="en-US" sz="1400" dirty="0" smtClean="0">
+              <a:rPr lang="" altLang="en-US" sz="1400" dirty="0" smtClean="0">
                 <a:effectLst>
                   <a:outerShdw blurRad="38100" dist="38100" dir="2700000" algn="tl">
                     <a:srgbClr val="000000">
@@ -3957,9 +5385,9 @@
                 </a:effectLst>
                 <a:latin typeface="Century Gothic" pitchFamily="34" charset="0"/>
               </a:rPr>
-              <a:t>Title of the project</a:t>
-            </a:r>
-            <a:endParaRPr lang="tr-TR" sz="1400" dirty="0">
+              <a:t>Image Steganography</a:t>
+            </a:r>
+            <a:endParaRPr lang="" altLang="en-US" sz="1400" dirty="0" smtClean="0">
               <a:effectLst>
                 <a:outerShdw blurRad="38100" dist="38100" dir="2700000" algn="tl">
                   <a:srgbClr val="000000">
@@ -3975,9 +5403,7 @@
       <p:sp>
         <p:nvSpPr>
           <p:cNvPr id="6" name="Footer Placeholder 4"/>
-          <p:cNvSpPr txBox="1">
-            <a:spLocks/>
-          </p:cNvSpPr>
+          <p:cNvSpPr txBox="1"/>
           <p:nvPr/>
         </p:nvSpPr>
         <p:spPr>
@@ -4011,7 +5437,6 @@
               <a:buSzTx/>
               <a:buFontTx/>
               <a:buNone/>
-              <a:tabLst/>
               <a:defRPr/>
             </a:pPr>
             <a:fld id="{920BB873-19B1-47CA-9FBA-06779EDAA9C1}" type="slidenum">
@@ -4026,24 +5451,6 @@
                 <a:ea typeface="+mn-ea"/>
                 <a:cs typeface="+mn-cs"/>
               </a:rPr>
-              <a:pPr marL="0" marR="0" lvl="0" indent="0" algn="r" defTabSz="914400" rtl="0" eaLnBrk="1" fontAlgn="auto" latinLnBrk="0" hangingPunct="1">
-                <a:lnSpc>
-                  <a:spcPct val="100000"/>
-                </a:lnSpc>
-                <a:spcBef>
-                  <a:spcPts val="0"/>
-                </a:spcBef>
-                <a:spcAft>
-                  <a:spcPts val="0"/>
-                </a:spcAft>
-                <a:buClrTx/>
-                <a:buSzTx/>
-                <a:buFontTx/>
-                <a:buNone/>
-                <a:tabLst/>
-                <a:defRPr/>
-              </a:pPr>
-              <a:t>2</a:t>
             </a:fld>
             <a:endParaRPr kumimoji="0" lang="en-US" sz="1000" b="1" i="0" u="none" strike="noStrike" kern="1200" cap="none" spc="0" normalizeH="0" baseline="0" noProof="0" dirty="0">
               <a:ln>
@@ -4128,41 +5535,60 @@
         <p:spPr/>
         <p:txBody>
           <a:bodyPr>
-            <a:normAutofit fontScale="92500" lnSpcReduction="10000"/>
+            <a:normAutofit fontScale="70000"/>
           </a:bodyPr>
           <a:lstStyle/>
           <a:p>
             <a:r>
-              <a:rPr lang="en-US" sz="3500" dirty="0" smtClean="0"/>
-              <a:t>Tell us what is your motivation to do this project</a:t>
-            </a:r>
-          </a:p>
-          <a:p>
-            <a:r>
-              <a:rPr lang="en-US" sz="3500" dirty="0" smtClean="0"/>
-              <a:t>Previous implementations/approaches to the project done (with references)</a:t>
-            </a:r>
-          </a:p>
-          <a:p>
-            <a:r>
-              <a:rPr lang="en-US" sz="3500" dirty="0" smtClean="0"/>
-              <a:t>Planning of the project done </a:t>
-            </a:r>
-          </a:p>
-          <a:p>
-            <a:r>
-              <a:rPr lang="en-US" sz="3500" dirty="0" smtClean="0"/>
-              <a:t>Did you conform to the schedule you promised before?</a:t>
-            </a:r>
-          </a:p>
-          <a:p>
-            <a:endParaRPr lang="en-US" sz="2600" dirty="0" smtClean="0"/>
-          </a:p>
-          <a:p>
-            <a:r>
-              <a:rPr lang="en-US" sz="2200" dirty="0" smtClean="0"/>
-              <a:t>It is recommended to shortly point out what you’re going to show in the work done section?!</a:t>
-            </a:r>
+              <a:rPr lang="" altLang="en-US" sz="3500" dirty="0" smtClean="0"/>
+              <a:t>Steganography is the art of concealing information within other non-secret data.</a:t>
+            </a:r>
+            <a:endParaRPr lang="en-US" sz="3500" dirty="0" smtClean="0"/>
+          </a:p>
+          <a:p>
+            <a:r>
+              <a:rPr lang="en-US" altLang="en-US" sz="3500" dirty="0" smtClean="0">
+                <a:sym typeface="+mn-ea"/>
+              </a:rPr>
+              <a:t>With increase in computational power everyday I think encryption is becoming obsolete and attacks on encrypted data have increased.</a:t>
+            </a:r>
+            <a:endParaRPr lang="en-US" altLang="en-US" sz="3500" dirty="0" smtClean="0"/>
+          </a:p>
+          <a:p>
+            <a:r>
+              <a:rPr lang="en-US" altLang="en-US" sz="3500" dirty="0" smtClean="0">
+                <a:sym typeface="+mn-ea"/>
+              </a:rPr>
+              <a:t>Even with the rise in computational power if we turn to steganography the attacks might be minimized because the attacker might no be able to distinguish between a normal image and an image containing sensitive data.</a:t>
+            </a:r>
+            <a:endParaRPr lang="en-US" altLang="en-US" sz="3500" dirty="0" smtClean="0">
+              <a:sym typeface="+mn-ea"/>
+            </a:endParaRPr>
+          </a:p>
+          <a:p>
+            <a:r>
+              <a:rPr lang="en-US" altLang="en-US" sz="3500">
+                <a:sym typeface="+mn-ea"/>
+              </a:rPr>
+              <a:t>Sensitive data might be system passwords or keys</a:t>
+            </a:r>
+            <a:r>
+              <a:rPr lang="" altLang="en-US" sz="3500">
+                <a:sym typeface="+mn-ea"/>
+              </a:rPr>
+              <a:t>.</a:t>
+            </a:r>
+            <a:endParaRPr lang="" altLang="en-US" sz="3500">
+              <a:sym typeface="+mn-ea"/>
+            </a:endParaRPr>
+          </a:p>
+          <a:p>
+            <a:endParaRPr lang="en-US" altLang="en-US" sz="3500">
+              <a:sym typeface="+mn-ea"/>
+            </a:endParaRPr>
+          </a:p>
+          <a:p>
+            <a:endParaRPr lang="" sz="2200" dirty="0" smtClean="0"/>
           </a:p>
         </p:txBody>
       </p:sp>
@@ -4175,7 +5601,7 @@
         <p:spPr>
           <a:xfrm>
             <a:off x="3200400" y="6474023"/>
-            <a:ext cx="2667000" cy="307777"/>
+            <a:ext cx="2667000" cy="306705"/>
           </a:xfrm>
           <a:prstGeom prst="rect">
             <a:avLst/>
@@ -4192,12 +5618,12 @@
                 <a:spcPct val="20000"/>
               </a:spcBef>
               <a:tabLst>
-                <a:tab pos="1027113" algn="l"/>
+                <a:tab pos="1026795" algn="l"/>
               </a:tabLst>
               <a:defRPr/>
             </a:pPr>
             <a:r>
-              <a:rPr lang="en-US" sz="1400" dirty="0" smtClean="0">
+              <a:rPr lang="" altLang="tr-TR" sz="1400" dirty="0">
                 <a:effectLst>
                   <a:outerShdw blurRad="38100" dist="38100" dir="2700000" algn="tl">
                     <a:srgbClr val="000000">
@@ -4207,9 +5633,9 @@
                 </a:effectLst>
                 <a:latin typeface="Century Gothic" pitchFamily="34" charset="0"/>
               </a:rPr>
-              <a:t>Title of the project</a:t>
-            </a:r>
-            <a:endParaRPr lang="tr-TR" sz="1400" dirty="0">
+              <a:t>Image Steganography</a:t>
+            </a:r>
+            <a:endParaRPr lang="" altLang="tr-TR" sz="1400" dirty="0">
               <a:effectLst>
                 <a:outerShdw blurRad="38100" dist="38100" dir="2700000" algn="tl">
                   <a:srgbClr val="000000">
@@ -4225,9 +5651,7 @@
       <p:sp>
         <p:nvSpPr>
           <p:cNvPr id="6" name="Footer Placeholder 4"/>
-          <p:cNvSpPr txBox="1">
-            <a:spLocks/>
-          </p:cNvSpPr>
+          <p:cNvSpPr txBox="1"/>
           <p:nvPr/>
         </p:nvSpPr>
         <p:spPr>
@@ -4261,7 +5685,6 @@
               <a:buSzTx/>
               <a:buFontTx/>
               <a:buNone/>
-              <a:tabLst/>
               <a:defRPr/>
             </a:pPr>
             <a:fld id="{920BB873-19B1-47CA-9FBA-06779EDAA9C1}" type="slidenum">
@@ -4276,24 +5699,6 @@
                 <a:ea typeface="+mn-ea"/>
                 <a:cs typeface="+mn-cs"/>
               </a:rPr>
-              <a:pPr marL="0" marR="0" lvl="0" indent="0" algn="r" defTabSz="914400" rtl="0" eaLnBrk="1" fontAlgn="auto" latinLnBrk="0" hangingPunct="1">
-                <a:lnSpc>
-                  <a:spcPct val="100000"/>
-                </a:lnSpc>
-                <a:spcBef>
-                  <a:spcPts val="0"/>
-                </a:spcBef>
-                <a:spcAft>
-                  <a:spcPts val="0"/>
-                </a:spcAft>
-                <a:buClrTx/>
-                <a:buSzTx/>
-                <a:buFontTx/>
-                <a:buNone/>
-                <a:tabLst/>
-                <a:defRPr/>
-              </a:pPr>
-              <a:t>3</a:t>
             </a:fld>
             <a:endParaRPr kumimoji="0" lang="en-US" sz="1000" b="1" i="0" u="none" strike="noStrike" kern="1200" cap="none" spc="0" normalizeH="0" baseline="0" noProof="0" dirty="0">
               <a:ln>
@@ -4333,14 +5738,7 @@
         <p:cNvGrpSpPr/>
         <p:nvPr/>
       </p:nvGrpSpPr>
-      <p:grpSpPr>
-        <a:xfrm>
-          <a:off x="0" y="0"/>
-          <a:ext cx="0" cy="0"/>
-          <a:chOff x="0" y="0"/>
-          <a:chExt cx="0" cy="0"/>
-        </a:xfrm>
-      </p:grpSpPr>
+      <p:grpSpPr/>
       <p:sp>
         <p:nvSpPr>
           <p:cNvPr id="2" name="Title 1"/>
@@ -4354,14 +5752,13 @@
         <p:spPr/>
         <p:txBody>
           <a:bodyPr/>
-          <a:lstStyle/>
           <a:p>
             <a:pPr algn="l"/>
             <a:r>
-              <a:rPr lang="en-US" dirty="0" smtClean="0"/>
-              <a:t>Technology used</a:t>
-            </a:r>
-            <a:endParaRPr lang="en-US" dirty="0"/>
+              <a:rPr lang="" altLang="en-US"/>
+              <a:t>Previous Implementation</a:t>
+            </a:r>
+            <a:endParaRPr lang="" altLang="en-US"/>
           </a:p>
         </p:txBody>
       </p:sp>
@@ -4378,102 +5775,108 @@
         <p:spPr/>
         <p:txBody>
           <a:bodyPr>
-            <a:normAutofit/>
+            <a:normAutofit lnSpcReduction="10000"/>
           </a:bodyPr>
-          <a:lstStyle/>
-          <a:p>
-            <a:r>
-              <a:rPr lang="en-US" dirty="0"/>
-              <a:t>Platform used </a:t>
-            </a:r>
-          </a:p>
-          <a:p>
-            <a:pPr lvl="1"/>
-            <a:r>
-              <a:rPr lang="en-US" dirty="0"/>
-              <a:t>Windows, Linux, Android, </a:t>
-            </a:r>
-            <a:r>
-              <a:rPr lang="en-US" dirty="0" err="1"/>
-              <a:t>iOS</a:t>
-            </a:r>
-            <a:r>
-              <a:rPr lang="en-US" dirty="0"/>
-              <a:t>, etc.</a:t>
-            </a:r>
-          </a:p>
-          <a:p>
-            <a:r>
-              <a:rPr lang="en-US" dirty="0"/>
-              <a:t>Programming </a:t>
-            </a:r>
-            <a:r>
-              <a:rPr lang="en-US" dirty="0" smtClean="0"/>
-              <a:t>languages, scripts </a:t>
-            </a:r>
-            <a:r>
-              <a:rPr lang="en-US" dirty="0"/>
-              <a:t>used</a:t>
-            </a:r>
-          </a:p>
-          <a:p>
-            <a:pPr lvl="1"/>
-            <a:r>
-              <a:rPr lang="en-US" dirty="0"/>
-              <a:t>C/C++, C#, Java, PHP, ASP, JavaScript, etc.</a:t>
-            </a:r>
-          </a:p>
-          <a:p>
-            <a:r>
-              <a:rPr lang="en-US" dirty="0" smtClean="0"/>
-              <a:t>Database management system</a:t>
-            </a:r>
-          </a:p>
-          <a:p>
-            <a:pPr lvl="1"/>
-            <a:r>
-              <a:rPr lang="en-US" dirty="0" smtClean="0"/>
-              <a:t>SQL server, </a:t>
-            </a:r>
-            <a:r>
-              <a:rPr lang="en-US" dirty="0" err="1" smtClean="0"/>
-              <a:t>MySQL</a:t>
-            </a:r>
-            <a:r>
-              <a:rPr lang="en-US" dirty="0" smtClean="0"/>
-              <a:t>, Oracle, etc.</a:t>
-            </a:r>
-          </a:p>
-          <a:p>
-            <a:endParaRPr lang="en-US" sz="2000" dirty="0"/>
-          </a:p>
-          <a:p>
-            <a:endParaRPr lang="en-US" sz="2000" dirty="0" smtClean="0"/>
-          </a:p>
-          <a:p>
-            <a:r>
-              <a:rPr lang="en-US" sz="2000" dirty="0" smtClean="0"/>
-              <a:t>It is recommended to shortly point out why you’ve selected them?!</a:t>
-            </a:r>
-            <a:endParaRPr lang="en-US" sz="2000" dirty="0"/>
-          </a:p>
-        </p:txBody>
-      </p:sp>
-      <p:sp>
-        <p:nvSpPr>
-          <p:cNvPr id="4" name="Rectangle 3"/>
-          <p:cNvSpPr/>
+          <a:p>
+            <a:r>
+              <a:rPr lang="" altLang="en-US"/>
+              <a:t>The basic method of LSB is bit substition on the LSB of the color matrices.</a:t>
+            </a:r>
+            <a:endParaRPr lang="" altLang="en-US"/>
+          </a:p>
+          <a:p>
+            <a:endParaRPr lang="" altLang="en-US"/>
+          </a:p>
+          <a:p>
+            <a:r>
+              <a:rPr lang="" altLang="en-US"/>
+              <a:t>For instance these bits (</a:t>
+            </a:r>
+            <a:r>
+              <a:rPr lang="" altLang="en-US" b="1"/>
+              <a:t>110100010)</a:t>
+            </a:r>
+            <a:r>
+              <a:rPr lang="" altLang="en-US"/>
+              <a:t> of sensitive data need to be embedded.</a:t>
+            </a:r>
+            <a:endParaRPr lang="" altLang="en-US"/>
+          </a:p>
+          <a:p>
+            <a:endParaRPr lang="" altLang="en-US"/>
+          </a:p>
+          <a:p>
+            <a:r>
+              <a:rPr lang="" altLang="en-US"/>
+              <a:t>The data will be simply substituted into every LSB matrix, however this is not secure.</a:t>
+            </a:r>
+            <a:endParaRPr lang="" altLang="en-US"/>
+          </a:p>
+        </p:txBody>
+      </p:sp>
+      <p:pic>
+        <p:nvPicPr>
+          <p:cNvPr id="4" name="Picture 3" descr="pptx pxl data"/>
+          <p:cNvPicPr>
+            <a:picLocks noChangeAspect="1"/>
+          </p:cNvPicPr>
           <p:nvPr/>
-        </p:nvSpPr>
+        </p:nvPicPr>
+        <p:blipFill>
+          <a:blip r:embed="rId1"/>
+          <a:stretch>
+            <a:fillRect/>
+          </a:stretch>
+        </p:blipFill>
         <p:spPr>
           <a:xfrm>
-            <a:off x="3200400" y="6474023"/>
-            <a:ext cx="2667000" cy="307777"/>
+            <a:off x="3042920" y="2513965"/>
+            <a:ext cx="3057525" cy="647700"/>
           </a:xfrm>
           <a:prstGeom prst="rect">
             <a:avLst/>
           </a:prstGeom>
         </p:spPr>
+      </p:pic>
+      <p:pic>
+        <p:nvPicPr>
+          <p:cNvPr id="5" name="Picture 4" descr="pptx pxl data mod"/>
+          <p:cNvPicPr>
+            <a:picLocks noChangeAspect="1"/>
+          </p:cNvPicPr>
+          <p:nvPr/>
+        </p:nvPicPr>
+        <p:blipFill>
+          <a:blip r:embed="rId2"/>
+          <a:stretch>
+            <a:fillRect/>
+          </a:stretch>
+        </p:blipFill>
+        <p:spPr>
+          <a:xfrm>
+            <a:off x="3033395" y="4015740"/>
+            <a:ext cx="3076575" cy="628650"/>
+          </a:xfrm>
+          <a:prstGeom prst="rect">
+            <a:avLst/>
+          </a:prstGeom>
+        </p:spPr>
+      </p:pic>
+      <p:sp>
+        <p:nvSpPr>
+          <p:cNvPr id="6" name="Rectangle 5"/>
+          <p:cNvSpPr/>
+          <p:nvPr/>
+        </p:nvSpPr>
+        <p:spPr>
+          <a:xfrm>
+            <a:off x="3200400" y="6474023"/>
+            <a:ext cx="2667000" cy="306705"/>
+          </a:xfrm>
+          <a:prstGeom prst="rect">
+            <a:avLst/>
+          </a:prstGeom>
+        </p:spPr>
         <p:txBody>
           <a:bodyPr wrap="square">
             <a:spAutoFit/>
@@ -4485,12 +5888,12 @@
                 <a:spcPct val="20000"/>
               </a:spcBef>
               <a:tabLst>
-                <a:tab pos="1027113" algn="l"/>
+                <a:tab pos="1026795" algn="l"/>
               </a:tabLst>
               <a:defRPr/>
             </a:pPr>
             <a:r>
-              <a:rPr lang="en-US" sz="1400" dirty="0" smtClean="0">
+              <a:rPr lang="en-US" altLang="en-US" sz="1400" dirty="0" smtClean="0">
                 <a:effectLst>
                   <a:outerShdw blurRad="38100" dist="38100" dir="2700000" algn="tl">
                     <a:srgbClr val="000000">
@@ -4500,9 +5903,9 @@
                 </a:effectLst>
                 <a:latin typeface="Century Gothic" pitchFamily="34" charset="0"/>
               </a:rPr>
-              <a:t>Title of the project</a:t>
-            </a:r>
-            <a:endParaRPr lang="tr-TR" sz="1400" dirty="0">
+              <a:t>Image Steganography</a:t>
+            </a:r>
+            <a:endParaRPr lang="en-US" altLang="en-US" sz="1400" dirty="0" smtClean="0">
               <a:effectLst>
                 <a:outerShdw blurRad="38100" dist="38100" dir="2700000" algn="tl">
                   <a:srgbClr val="000000">
@@ -4515,105 +5918,11 @@
           </a:p>
         </p:txBody>
       </p:sp>
-      <p:sp>
-        <p:nvSpPr>
-          <p:cNvPr id="6" name="Footer Placeholder 4"/>
-          <p:cNvSpPr txBox="1">
-            <a:spLocks/>
-          </p:cNvSpPr>
-          <p:nvPr/>
-        </p:nvSpPr>
-        <p:spPr>
-          <a:xfrm>
-            <a:off x="8305800" y="6462444"/>
-            <a:ext cx="762000" cy="299608"/>
-          </a:xfrm>
-          <a:prstGeom prst="rect">
-            <a:avLst/>
-          </a:prstGeom>
-        </p:spPr>
-        <p:txBody>
-          <a:bodyPr vert="horz" lIns="91440" tIns="45720" rIns="91440" bIns="45720" rtlCol="0" anchor="ctr"/>
-          <a:lstStyle>
-            <a:lvl1pPr>
-              <a:defRPr sz="1200"/>
-            </a:lvl1pPr>
-          </a:lstStyle>
-          <a:p>
-            <a:pPr marL="0" marR="0" lvl="0" indent="0" algn="r" defTabSz="914400" rtl="0" eaLnBrk="1" fontAlgn="auto" latinLnBrk="0" hangingPunct="1">
-              <a:lnSpc>
-                <a:spcPct val="100000"/>
-              </a:lnSpc>
-              <a:spcBef>
-                <a:spcPts val="0"/>
-              </a:spcBef>
-              <a:spcAft>
-                <a:spcPts val="0"/>
-              </a:spcAft>
-              <a:buClrTx/>
-              <a:buSzTx/>
-              <a:buFontTx/>
-              <a:buNone/>
-              <a:tabLst/>
-              <a:defRPr/>
-            </a:pPr>
-            <a:fld id="{920BB873-19B1-47CA-9FBA-06779EDAA9C1}" type="slidenum">
-              <a:rPr kumimoji="0" lang="en-US" sz="1000" b="1" i="0" u="none" strike="noStrike" kern="1200" cap="none" spc="0" normalizeH="0" baseline="0" noProof="0" smtClean="0">
-                <a:ln>
-                  <a:noFill/>
-                </a:ln>
-                <a:effectLst/>
-                <a:uLnTx/>
-                <a:uFillTx/>
-                <a:latin typeface="Lucida Bright" pitchFamily="18" charset="0"/>
-                <a:ea typeface="+mn-ea"/>
-                <a:cs typeface="+mn-cs"/>
-              </a:rPr>
-              <a:pPr marL="0" marR="0" lvl="0" indent="0" algn="r" defTabSz="914400" rtl="0" eaLnBrk="1" fontAlgn="auto" latinLnBrk="0" hangingPunct="1">
-                <a:lnSpc>
-                  <a:spcPct val="100000"/>
-                </a:lnSpc>
-                <a:spcBef>
-                  <a:spcPts val="0"/>
-                </a:spcBef>
-                <a:spcAft>
-                  <a:spcPts val="0"/>
-                </a:spcAft>
-                <a:buClrTx/>
-                <a:buSzTx/>
-                <a:buFontTx/>
-                <a:buNone/>
-                <a:tabLst/>
-                <a:defRPr/>
-              </a:pPr>
-              <a:t>4</a:t>
-            </a:fld>
-            <a:endParaRPr kumimoji="0" lang="en-US" sz="1000" b="1" i="0" u="none" strike="noStrike" kern="1200" cap="none" spc="0" normalizeH="0" baseline="0" noProof="0" dirty="0">
-              <a:ln>
-                <a:noFill/>
-              </a:ln>
-              <a:effectLst/>
-              <a:uLnTx/>
-              <a:uFillTx/>
-              <a:latin typeface="Lucida Bright" pitchFamily="18" charset="0"/>
-              <a:ea typeface="+mn-ea"/>
-              <a:cs typeface="+mn-cs"/>
-            </a:endParaRPr>
-          </a:p>
-        </p:txBody>
-      </p:sp>
     </p:spTree>
   </p:cSld>
   <p:clrMapOvr>
     <a:masterClrMapping/>
   </p:clrMapOvr>
-  <p:timing>
-    <p:tnLst>
-      <p:par>
-        <p:cTn id="1" dur="indefinite" restart="never" nodeType="tmRoot"/>
-      </p:par>
-    </p:tnLst>
-  </p:timing>
 </p:sld>
 </file>
 
@@ -4626,14 +5935,7 @@
         <p:cNvGrpSpPr/>
         <p:nvPr/>
       </p:nvGrpSpPr>
-      <p:grpSpPr>
-        <a:xfrm>
-          <a:off x="0" y="0"/>
-          <a:ext cx="0" cy="0"/>
-          <a:chOff x="0" y="0"/>
-          <a:chExt cx="0" cy="0"/>
-        </a:xfrm>
-      </p:grpSpPr>
+      <p:grpSpPr/>
       <p:sp>
         <p:nvSpPr>
           <p:cNvPr id="2" name="Title 1"/>
@@ -4646,82 +5948,60 @@
         </p:nvSpPr>
         <p:spPr/>
         <p:txBody>
-          <a:bodyPr/>
-          <a:lstStyle/>
+          <a:bodyPr>
+            <a:normAutofit fontScale="90000"/>
+          </a:bodyPr>
           <a:p>
             <a:pPr algn="l"/>
             <a:r>
-              <a:rPr lang="en-US" dirty="0" smtClean="0"/>
-              <a:t>Work done</a:t>
-            </a:r>
-            <a:endParaRPr lang="en-US" dirty="0"/>
-          </a:p>
-        </p:txBody>
-      </p:sp>
-      <p:sp>
-        <p:nvSpPr>
-          <p:cNvPr id="3" name="Content Placeholder 2"/>
-          <p:cNvSpPr>
-            <a:spLocks noGrp="1"/>
-          </p:cNvSpPr>
+              <a:rPr lang="" altLang="en-US"/>
+              <a:t>Previous Implementation (Cont.)</a:t>
+            </a:r>
+            <a:endParaRPr lang="" altLang="en-US"/>
+          </a:p>
+        </p:txBody>
+      </p:sp>
+      <p:pic>
+        <p:nvPicPr>
+          <p:cNvPr id="4" name="Content Placeholder 3" descr="unsecure steg proc"/>
+          <p:cNvPicPr>
+            <a:picLocks noChangeAspect="1"/>
+          </p:cNvPicPr>
           <p:nvPr>
             <p:ph idx="1"/>
           </p:nvPr>
-        </p:nvSpPr>
-        <p:spPr/>
-        <p:txBody>
-          <a:bodyPr>
-            <a:normAutofit lnSpcReduction="10000"/>
-          </a:bodyPr>
-          <a:lstStyle/>
-          <a:p>
-            <a:r>
-              <a:rPr lang="en-US" dirty="0" smtClean="0"/>
-              <a:t>First “important” part of the presentation</a:t>
-            </a:r>
-          </a:p>
-          <a:p>
-            <a:r>
-              <a:rPr lang="en-US" dirty="0" smtClean="0"/>
-              <a:t>Show us flowcharts, algorithms, ER diagrams, UML diagrams, etc.</a:t>
-            </a:r>
-          </a:p>
-          <a:p>
-            <a:r>
-              <a:rPr lang="en-US" dirty="0" smtClean="0"/>
-              <a:t>Possibly the project is divided into some phases, subtitles, modules, etc.</a:t>
-            </a:r>
-          </a:p>
-          <a:p>
-            <a:r>
-              <a:rPr lang="en-US" dirty="0" smtClean="0"/>
-              <a:t>Implementation details (shortly)</a:t>
-            </a:r>
-          </a:p>
-          <a:p>
-            <a:r>
-              <a:rPr lang="en-US" dirty="0" smtClean="0"/>
-              <a:t>Tell us most crucial part of the implementation stressing on difficulties faced and solutions provided</a:t>
-            </a:r>
-            <a:endParaRPr lang="en-US" dirty="0"/>
-          </a:p>
-        </p:txBody>
-      </p:sp>
-      <p:sp>
-        <p:nvSpPr>
-          <p:cNvPr id="4" name="Rectangle 3"/>
-          <p:cNvSpPr/>
-          <p:nvPr/>
-        </p:nvSpPr>
+        </p:nvPicPr>
+        <p:blipFill>
+          <a:blip r:embed="rId1"/>
+          <a:stretch>
+            <a:fillRect/>
+          </a:stretch>
+        </p:blipFill>
         <p:spPr>
           <a:xfrm>
-            <a:off x="3200400" y="6474023"/>
-            <a:ext cx="2667000" cy="307777"/>
+            <a:off x="581025" y="2746375"/>
+            <a:ext cx="7981950" cy="1714500"/>
           </a:xfrm>
           <a:prstGeom prst="rect">
             <a:avLst/>
           </a:prstGeom>
         </p:spPr>
+      </p:pic>
+      <p:sp>
+        <p:nvSpPr>
+          <p:cNvPr id="5" name="Rectangle 4"/>
+          <p:cNvSpPr/>
+          <p:nvPr/>
+        </p:nvSpPr>
+        <p:spPr>
+          <a:xfrm>
+            <a:off x="3200400" y="6474023"/>
+            <a:ext cx="2667000" cy="306705"/>
+          </a:xfrm>
+          <a:prstGeom prst="rect">
+            <a:avLst/>
+          </a:prstGeom>
+        </p:spPr>
         <p:txBody>
           <a:bodyPr wrap="square">
             <a:spAutoFit/>
@@ -4733,12 +6013,12 @@
                 <a:spcPct val="20000"/>
               </a:spcBef>
               <a:tabLst>
-                <a:tab pos="1027113" algn="l"/>
+                <a:tab pos="1026795" algn="l"/>
               </a:tabLst>
               <a:defRPr/>
             </a:pPr>
             <a:r>
-              <a:rPr lang="en-US" sz="1400" dirty="0" smtClean="0">
+              <a:rPr lang="en-US" altLang="en-US" sz="1400" dirty="0" smtClean="0">
                 <a:effectLst>
                   <a:outerShdw blurRad="38100" dist="38100" dir="2700000" algn="tl">
                     <a:srgbClr val="000000">
@@ -4748,9 +6028,9 @@
                 </a:effectLst>
                 <a:latin typeface="Century Gothic" pitchFamily="34" charset="0"/>
               </a:rPr>
-              <a:t>Title of the project</a:t>
-            </a:r>
-            <a:endParaRPr lang="tr-TR" sz="1400" dirty="0">
+              <a:t>Image Steganography</a:t>
+            </a:r>
+            <a:endParaRPr lang="en-US" altLang="en-US" sz="1400" dirty="0" smtClean="0">
               <a:effectLst>
                 <a:outerShdw blurRad="38100" dist="38100" dir="2700000" algn="tl">
                   <a:srgbClr val="000000">
@@ -4763,105 +6043,11 @@
           </a:p>
         </p:txBody>
       </p:sp>
-      <p:sp>
-        <p:nvSpPr>
-          <p:cNvPr id="5" name="Footer Placeholder 4"/>
-          <p:cNvSpPr txBox="1">
-            <a:spLocks/>
-          </p:cNvSpPr>
-          <p:nvPr/>
-        </p:nvSpPr>
-        <p:spPr>
-          <a:xfrm>
-            <a:off x="8305800" y="6462444"/>
-            <a:ext cx="762000" cy="299608"/>
-          </a:xfrm>
-          <a:prstGeom prst="rect">
-            <a:avLst/>
-          </a:prstGeom>
-        </p:spPr>
-        <p:txBody>
-          <a:bodyPr vert="horz" lIns="91440" tIns="45720" rIns="91440" bIns="45720" rtlCol="0" anchor="ctr"/>
-          <a:lstStyle>
-            <a:lvl1pPr>
-              <a:defRPr sz="1200"/>
-            </a:lvl1pPr>
-          </a:lstStyle>
-          <a:p>
-            <a:pPr marL="0" marR="0" lvl="0" indent="0" algn="r" defTabSz="914400" rtl="0" eaLnBrk="1" fontAlgn="auto" latinLnBrk="0" hangingPunct="1">
-              <a:lnSpc>
-                <a:spcPct val="100000"/>
-              </a:lnSpc>
-              <a:spcBef>
-                <a:spcPts val="0"/>
-              </a:spcBef>
-              <a:spcAft>
-                <a:spcPts val="0"/>
-              </a:spcAft>
-              <a:buClrTx/>
-              <a:buSzTx/>
-              <a:buFontTx/>
-              <a:buNone/>
-              <a:tabLst/>
-              <a:defRPr/>
-            </a:pPr>
-            <a:fld id="{920BB873-19B1-47CA-9FBA-06779EDAA9C1}" type="slidenum">
-              <a:rPr kumimoji="0" lang="en-US" sz="1000" b="1" i="0" u="none" strike="noStrike" kern="1200" cap="none" spc="0" normalizeH="0" baseline="0" noProof="0" smtClean="0">
-                <a:ln>
-                  <a:noFill/>
-                </a:ln>
-                <a:effectLst/>
-                <a:uLnTx/>
-                <a:uFillTx/>
-                <a:latin typeface="Lucida Bright" pitchFamily="18" charset="0"/>
-                <a:ea typeface="+mn-ea"/>
-                <a:cs typeface="+mn-cs"/>
-              </a:rPr>
-              <a:pPr marL="0" marR="0" lvl="0" indent="0" algn="r" defTabSz="914400" rtl="0" eaLnBrk="1" fontAlgn="auto" latinLnBrk="0" hangingPunct="1">
-                <a:lnSpc>
-                  <a:spcPct val="100000"/>
-                </a:lnSpc>
-                <a:spcBef>
-                  <a:spcPts val="0"/>
-                </a:spcBef>
-                <a:spcAft>
-                  <a:spcPts val="0"/>
-                </a:spcAft>
-                <a:buClrTx/>
-                <a:buSzTx/>
-                <a:buFontTx/>
-                <a:buNone/>
-                <a:tabLst/>
-                <a:defRPr/>
-              </a:pPr>
-              <a:t>5</a:t>
-            </a:fld>
-            <a:endParaRPr kumimoji="0" lang="en-US" sz="1000" b="1" i="0" u="none" strike="noStrike" kern="1200" cap="none" spc="0" normalizeH="0" baseline="0" noProof="0" dirty="0">
-              <a:ln>
-                <a:noFill/>
-              </a:ln>
-              <a:effectLst/>
-              <a:uLnTx/>
-              <a:uFillTx/>
-              <a:latin typeface="Lucida Bright" pitchFamily="18" charset="0"/>
-              <a:ea typeface="+mn-ea"/>
-              <a:cs typeface="+mn-cs"/>
-            </a:endParaRPr>
-          </a:p>
-        </p:txBody>
-      </p:sp>
     </p:spTree>
   </p:cSld>
   <p:clrMapOvr>
     <a:masterClrMapping/>
   </p:clrMapOvr>
-  <p:timing>
-    <p:tnLst>
-      <p:par>
-        <p:cTn id="1" dur="indefinite" restart="never" nodeType="tmRoot"/>
-      </p:par>
-    </p:tnLst>
-  </p:timing>
 </p:sld>
 </file>
 
@@ -4874,14 +6060,7 @@
         <p:cNvGrpSpPr/>
         <p:nvPr/>
       </p:nvGrpSpPr>
-      <p:grpSpPr>
-        <a:xfrm>
-          <a:off x="0" y="0"/>
-          <a:ext cx="0" cy="0"/>
-          <a:chOff x="0" y="0"/>
-          <a:chExt cx="0" cy="0"/>
-        </a:xfrm>
-      </p:grpSpPr>
+      <p:grpSpPr/>
       <p:sp>
         <p:nvSpPr>
           <p:cNvPr id="2" name="Title 1"/>
@@ -4895,14 +6074,13 @@
         <p:spPr/>
         <p:txBody>
           <a:bodyPr/>
-          <a:lstStyle/>
           <a:p>
             <a:pPr algn="l"/>
             <a:r>
-              <a:rPr lang="en-US" dirty="0" smtClean="0"/>
-              <a:t>Conclusions</a:t>
-            </a:r>
-            <a:endParaRPr lang="en-US" dirty="0"/>
+              <a:rPr lang="" altLang="en-US"/>
+              <a:t>Project Plan/Problem Definition</a:t>
+            </a:r>
+            <a:endParaRPr lang="" altLang="en-US"/>
           </a:p>
         </p:txBody>
       </p:sp>
@@ -4919,36 +6097,26 @@
         <p:spPr/>
         <p:txBody>
           <a:bodyPr/>
-          <a:lstStyle/>
-          <a:p>
-            <a:r>
-              <a:rPr lang="en-US" dirty="0" smtClean="0"/>
-              <a:t>Tell us what did you manage to do?</a:t>
-            </a:r>
-          </a:p>
-          <a:p>
-            <a:r>
-              <a:rPr lang="en-US" dirty="0" smtClean="0"/>
-              <a:t>Did you achieve the promises given in COMP400?</a:t>
-            </a:r>
-          </a:p>
-          <a:p>
-            <a:r>
-              <a:rPr lang="en-US" dirty="0" smtClean="0"/>
-              <a:t>Judge yourself!</a:t>
-            </a:r>
-          </a:p>
-          <a:p>
-            <a:r>
-              <a:rPr lang="en-US" dirty="0" smtClean="0"/>
-              <a:t>Tell us what you’ve learnt in this project?</a:t>
-            </a:r>
-          </a:p>
-          <a:p>
-            <a:r>
-              <a:rPr lang="en-US" dirty="0" smtClean="0"/>
-              <a:t>Tell us why you didn’t do this and that?</a:t>
-            </a:r>
+          <a:p>
+            <a:r>
+              <a:rPr lang="" altLang="en-US"/>
+              <a:t>Since the technique shown on the previous slide is not secure.</a:t>
+            </a:r>
+            <a:endParaRPr lang="" altLang="en-US"/>
+          </a:p>
+          <a:p>
+            <a:r>
+              <a:rPr lang="" altLang="en-US"/>
+              <a:t>For my project I planned to implement a way to securely embed the sensitive messages/text into images.</a:t>
+            </a:r>
+            <a:endParaRPr lang="" altLang="en-US"/>
+          </a:p>
+          <a:p>
+            <a:r>
+              <a:rPr lang="" altLang="en-US"/>
+              <a:t>According to this target I managed to accomplish my main goal.</a:t>
+            </a:r>
+            <a:endParaRPr lang="" altLang="en-US"/>
           </a:p>
         </p:txBody>
       </p:sp>
@@ -4961,7 +6129,7 @@
         <p:spPr>
           <a:xfrm>
             <a:off x="3200400" y="6474023"/>
-            <a:ext cx="2667000" cy="307777"/>
+            <a:ext cx="2667000" cy="306705"/>
           </a:xfrm>
           <a:prstGeom prst="rect">
             <a:avLst/>
@@ -4971,19 +6139,18 @@
           <a:bodyPr wrap="square">
             <a:spAutoFit/>
           </a:bodyPr>
-          <a:lstStyle/>
           <a:p>
             <a:pPr lvl="0" algn="ctr">
               <a:spcBef>
                 <a:spcPct val="20000"/>
               </a:spcBef>
               <a:tabLst>
-                <a:tab pos="1027113" algn="l"/>
+                <a:tab pos="1026795" algn="l"/>
               </a:tabLst>
               <a:defRPr/>
             </a:pPr>
             <a:r>
-              <a:rPr lang="en-US" sz="1400" dirty="0" smtClean="0">
+              <a:rPr lang="en-US" altLang="en-US" sz="1400" dirty="0" smtClean="0">
                 <a:effectLst>
                   <a:outerShdw blurRad="38100" dist="38100" dir="2700000" algn="tl">
                     <a:srgbClr val="000000">
@@ -4993,9 +6160,9 @@
                 </a:effectLst>
                 <a:latin typeface="Century Gothic" pitchFamily="34" charset="0"/>
               </a:rPr>
-              <a:t>Title of the project</a:t>
-            </a:r>
-            <a:endParaRPr lang="tr-TR" sz="1400" dirty="0">
+              <a:t>Image Steganography</a:t>
+            </a:r>
+            <a:endParaRPr lang="en-US" altLang="en-US" sz="1400" dirty="0" smtClean="0">
               <a:effectLst>
                 <a:outerShdw blurRad="38100" dist="38100" dir="2700000" algn="tl">
                   <a:srgbClr val="000000">
@@ -5008,105 +6175,11 @@
           </a:p>
         </p:txBody>
       </p:sp>
-      <p:sp>
-        <p:nvSpPr>
-          <p:cNvPr id="5" name="Footer Placeholder 4"/>
-          <p:cNvSpPr txBox="1">
-            <a:spLocks/>
-          </p:cNvSpPr>
-          <p:nvPr/>
-        </p:nvSpPr>
-        <p:spPr>
-          <a:xfrm>
-            <a:off x="8305800" y="6462444"/>
-            <a:ext cx="762000" cy="299608"/>
-          </a:xfrm>
-          <a:prstGeom prst="rect">
-            <a:avLst/>
-          </a:prstGeom>
-        </p:spPr>
-        <p:txBody>
-          <a:bodyPr vert="horz" lIns="91440" tIns="45720" rIns="91440" bIns="45720" rtlCol="0" anchor="ctr"/>
-          <a:lstStyle>
-            <a:lvl1pPr>
-              <a:defRPr sz="1200"/>
-            </a:lvl1pPr>
-          </a:lstStyle>
-          <a:p>
-            <a:pPr marL="0" marR="0" lvl="0" indent="0" algn="r" defTabSz="914400" rtl="0" eaLnBrk="1" fontAlgn="auto" latinLnBrk="0" hangingPunct="1">
-              <a:lnSpc>
-                <a:spcPct val="100000"/>
-              </a:lnSpc>
-              <a:spcBef>
-                <a:spcPts val="0"/>
-              </a:spcBef>
-              <a:spcAft>
-                <a:spcPts val="0"/>
-              </a:spcAft>
-              <a:buClrTx/>
-              <a:buSzTx/>
-              <a:buFontTx/>
-              <a:buNone/>
-              <a:tabLst/>
-              <a:defRPr/>
-            </a:pPr>
-            <a:fld id="{920BB873-19B1-47CA-9FBA-06779EDAA9C1}" type="slidenum">
-              <a:rPr kumimoji="0" lang="en-US" sz="1000" b="1" i="0" u="none" strike="noStrike" kern="1200" cap="none" spc="0" normalizeH="0" baseline="0" noProof="0" smtClean="0">
-                <a:ln>
-                  <a:noFill/>
-                </a:ln>
-                <a:effectLst/>
-                <a:uLnTx/>
-                <a:uFillTx/>
-                <a:latin typeface="Lucida Bright" pitchFamily="18" charset="0"/>
-                <a:ea typeface="+mn-ea"/>
-                <a:cs typeface="+mn-cs"/>
-              </a:rPr>
-              <a:pPr marL="0" marR="0" lvl="0" indent="0" algn="r" defTabSz="914400" rtl="0" eaLnBrk="1" fontAlgn="auto" latinLnBrk="0" hangingPunct="1">
-                <a:lnSpc>
-                  <a:spcPct val="100000"/>
-                </a:lnSpc>
-                <a:spcBef>
-                  <a:spcPts val="0"/>
-                </a:spcBef>
-                <a:spcAft>
-                  <a:spcPts val="0"/>
-                </a:spcAft>
-                <a:buClrTx/>
-                <a:buSzTx/>
-                <a:buFontTx/>
-                <a:buNone/>
-                <a:tabLst/>
-                <a:defRPr/>
-              </a:pPr>
-              <a:t>6</a:t>
-            </a:fld>
-            <a:endParaRPr kumimoji="0" lang="en-US" sz="1000" b="1" i="0" u="none" strike="noStrike" kern="1200" cap="none" spc="0" normalizeH="0" baseline="0" noProof="0" dirty="0">
-              <a:ln>
-                <a:noFill/>
-              </a:ln>
-              <a:effectLst/>
-              <a:uLnTx/>
-              <a:uFillTx/>
-              <a:latin typeface="Lucida Bright" pitchFamily="18" charset="0"/>
-              <a:ea typeface="+mn-ea"/>
-              <a:cs typeface="+mn-cs"/>
-            </a:endParaRPr>
-          </a:p>
-        </p:txBody>
-      </p:sp>
     </p:spTree>
   </p:cSld>
   <p:clrMapOvr>
     <a:masterClrMapping/>
   </p:clrMapOvr>
-  <p:timing>
-    <p:tnLst>
-      <p:par>
-        <p:cTn id="1" dur="indefinite" restart="never" nodeType="tmRoot"/>
-      </p:par>
-    </p:tnLst>
-  </p:timing>
 </p:sld>
 </file>
 
@@ -5145,7 +6218,15 @@
             <a:pPr algn="l"/>
             <a:r>
               <a:rPr lang="en-US" dirty="0" smtClean="0"/>
-              <a:t>Demonstration</a:t>
+              <a:t>Technology </a:t>
+            </a:r>
+            <a:r>
+              <a:rPr lang="" altLang="en-US" dirty="0" smtClean="0"/>
+              <a:t>U</a:t>
+            </a:r>
+            <a:r>
+              <a:rPr lang="en-US" dirty="0" smtClean="0"/>
+              <a:t>sed</a:t>
             </a:r>
             <a:endParaRPr lang="en-US" dirty="0"/>
           </a:p>
@@ -5163,26 +6244,82 @@
         </p:nvSpPr>
         <p:spPr/>
         <p:txBody>
-          <a:bodyPr/>
-          <a:lstStyle/>
-          <a:p>
+          <a:bodyPr>
+            <a:normAutofit/>
+          </a:bodyPr>
+          <a:lstStyle/>
+          <a:p>
+            <a:r>
+              <a:rPr lang="en-US" dirty="0"/>
+              <a:t>Platform used </a:t>
+            </a:r>
+            <a:endParaRPr lang="en-US" dirty="0"/>
+          </a:p>
+          <a:p>
+            <a:pPr lvl="1"/>
+            <a:r>
+              <a:rPr lang="en-US" dirty="0"/>
+              <a:t>Linux.</a:t>
+            </a:r>
+            <a:endParaRPr lang="en-US" dirty="0"/>
+          </a:p>
+          <a:p>
+            <a:r>
+              <a:rPr lang="en-US" dirty="0"/>
+              <a:t>Programming </a:t>
+            </a:r>
             <a:r>
               <a:rPr lang="en-US" dirty="0" smtClean="0"/>
-              <a:t>Second “important” part of the presentation</a:t>
-            </a:r>
-          </a:p>
-          <a:p>
-            <a:r>
-              <a:rPr lang="en-US" dirty="0" smtClean="0"/>
-              <a:t>Show us your project in short time presenting its all behaviors and functions</a:t>
-            </a:r>
-          </a:p>
-          <a:p>
-            <a:r>
-              <a:rPr lang="en-US" dirty="0" smtClean="0"/>
-              <a:t>Sample runs should be done before with possible data sets already installed to it (!)</a:t>
+              <a:t>languages, scripts </a:t>
+            </a:r>
+            <a:r>
+              <a:rPr lang="en-US" dirty="0"/>
+              <a:t>used</a:t>
             </a:r>
             <a:endParaRPr lang="en-US" dirty="0"/>
+          </a:p>
+          <a:p>
+            <a:pPr lvl="1"/>
+            <a:r>
+              <a:rPr lang="en-US" dirty="0"/>
+              <a:t>C++, </a:t>
+            </a:r>
+            <a:r>
+              <a:rPr lang="" altLang="en-US" dirty="0"/>
+              <a:t>QML</a:t>
+            </a:r>
+            <a:r>
+              <a:rPr lang="en-US" dirty="0"/>
+              <a:t>, JavaScript.</a:t>
+            </a:r>
+            <a:endParaRPr lang="en-US" dirty="0" smtClean="0"/>
+          </a:p>
+          <a:p>
+            <a:endParaRPr lang="en-US" sz="2000" dirty="0"/>
+          </a:p>
+          <a:p>
+            <a:endParaRPr lang="en-US" sz="2000" dirty="0" smtClean="0"/>
+          </a:p>
+          <a:p>
+            <a:r>
+              <a:rPr lang="" altLang="en-US" sz="2000" dirty="0"/>
+              <a:t>QML is a user interface markup language. (Qt Modeling Language).</a:t>
+            </a:r>
+            <a:endParaRPr lang="" altLang="en-US" sz="2000" dirty="0"/>
+          </a:p>
+          <a:p>
+            <a:r>
+              <a:rPr lang="" altLang="en-US" sz="2000" dirty="0"/>
+              <a:t>Inline JavaScript handles Imperative aspects in QML.</a:t>
+            </a:r>
+            <a:endParaRPr lang="" altLang="en-US" sz="2000" dirty="0"/>
+          </a:p>
+          <a:p>
+            <a:r>
+              <a:rPr lang="" altLang="en-US" sz="2000" dirty="0"/>
+              <a:t>QML and JavaScript code can be compiled to native C++ binaries with the Qt Quick compiler. This makes the application fast.</a:t>
+            </a:r>
+            <a:endParaRPr lang="" altLang="en-US" sz="2000" dirty="0"/>
           </a:p>
         </p:txBody>
       </p:sp>
@@ -5195,7 +6332,7 @@
         <p:spPr>
           <a:xfrm>
             <a:off x="3200400" y="6474023"/>
-            <a:ext cx="2667000" cy="307777"/>
+            <a:ext cx="2667000" cy="306705"/>
           </a:xfrm>
           <a:prstGeom prst="rect">
             <a:avLst/>
@@ -5212,12 +6349,12 @@
                 <a:spcPct val="20000"/>
               </a:spcBef>
               <a:tabLst>
-                <a:tab pos="1027113" algn="l"/>
+                <a:tab pos="1026795" algn="l"/>
               </a:tabLst>
               <a:defRPr/>
             </a:pPr>
             <a:r>
-              <a:rPr lang="en-US" sz="1400" dirty="0" smtClean="0">
+              <a:rPr lang="" altLang="en-US" sz="1400" dirty="0" smtClean="0">
                 <a:effectLst>
                   <a:outerShdw blurRad="38100" dist="38100" dir="2700000" algn="tl">
                     <a:srgbClr val="000000">
@@ -5227,9 +6364,9 @@
                 </a:effectLst>
                 <a:latin typeface="Century Gothic" pitchFamily="34" charset="0"/>
               </a:rPr>
-              <a:t>Title of the project</a:t>
-            </a:r>
-            <a:endParaRPr lang="tr-TR" sz="1400" dirty="0">
+              <a:t>Image Steganography</a:t>
+            </a:r>
+            <a:endParaRPr lang="" altLang="en-US" sz="1400" dirty="0" smtClean="0">
               <a:effectLst>
                 <a:outerShdw blurRad="38100" dist="38100" dir="2700000" algn="tl">
                   <a:srgbClr val="000000">
@@ -5244,10 +6381,8 @@
       </p:sp>
       <p:sp>
         <p:nvSpPr>
-          <p:cNvPr id="5" name="Footer Placeholder 4"/>
-          <p:cNvSpPr txBox="1">
-            <a:spLocks/>
-          </p:cNvSpPr>
+          <p:cNvPr id="6" name="Footer Placeholder 4"/>
+          <p:cNvSpPr txBox="1"/>
           <p:nvPr/>
         </p:nvSpPr>
         <p:spPr>
@@ -5281,7 +6416,6 @@
               <a:buSzTx/>
               <a:buFontTx/>
               <a:buNone/>
-              <a:tabLst/>
               <a:defRPr/>
             </a:pPr>
             <a:fld id="{920BB873-19B1-47CA-9FBA-06779EDAA9C1}" type="slidenum">
@@ -5296,24 +6430,6 @@
                 <a:ea typeface="+mn-ea"/>
                 <a:cs typeface="+mn-cs"/>
               </a:rPr>
-              <a:pPr marL="0" marR="0" lvl="0" indent="0" algn="r" defTabSz="914400" rtl="0" eaLnBrk="1" fontAlgn="auto" latinLnBrk="0" hangingPunct="1">
-                <a:lnSpc>
-                  <a:spcPct val="100000"/>
-                </a:lnSpc>
-                <a:spcBef>
-                  <a:spcPts val="0"/>
-                </a:spcBef>
-                <a:spcAft>
-                  <a:spcPts val="0"/>
-                </a:spcAft>
-                <a:buClrTx/>
-                <a:buSzTx/>
-                <a:buFontTx/>
-                <a:buNone/>
-                <a:tabLst/>
-                <a:defRPr/>
-              </a:pPr>
-              <a:t>7</a:t>
             </a:fld>
             <a:endParaRPr kumimoji="0" lang="en-US" sz="1000" b="1" i="0" u="none" strike="noStrike" kern="1200" cap="none" spc="0" normalizeH="0" baseline="0" noProof="0" dirty="0">
               <a:ln>
@@ -5379,7 +6495,15 @@
             <a:pPr algn="l"/>
             <a:r>
               <a:rPr lang="en-US" dirty="0" smtClean="0"/>
-              <a:t>Future work (optional)</a:t>
+              <a:t>Work </a:t>
+            </a:r>
+            <a:r>
+              <a:rPr lang="" altLang="en-US" dirty="0" smtClean="0"/>
+              <a:t>D</a:t>
+            </a:r>
+            <a:r>
+              <a:rPr lang="en-US" dirty="0" smtClean="0"/>
+              <a:t>one</a:t>
             </a:r>
             <a:endParaRPr lang="en-US" dirty="0"/>
           </a:p>
@@ -5397,13 +6521,18 @@
         </p:nvSpPr>
         <p:spPr/>
         <p:txBody>
-          <a:bodyPr/>
-          <a:lstStyle/>
-          <a:p>
-            <a:r>
-              <a:rPr lang="en-US" dirty="0" smtClean="0"/>
-              <a:t>If you’ve recommendations for future tell us about them in short?</a:t>
-            </a:r>
+          <a:bodyPr>
+            <a:normAutofit/>
+          </a:bodyPr>
+          <a:lstStyle/>
+          <a:p>
+            <a:r>
+              <a:rPr lang="" altLang="en-US" dirty="0" smtClean="0"/>
+              <a:t>Since I mentioned before that the I wanted to implement a secure LSB technique, I accomplished that by introducing a key into the equation.</a:t>
+            </a:r>
+            <a:endParaRPr lang="en-US" dirty="0" smtClean="0"/>
+          </a:p>
+          <a:p>
             <a:endParaRPr lang="en-US" dirty="0"/>
           </a:p>
         </p:txBody>
@@ -5417,7 +6546,7 @@
         <p:spPr>
           <a:xfrm>
             <a:off x="3200400" y="6474023"/>
-            <a:ext cx="2667000" cy="307777"/>
+            <a:ext cx="2667000" cy="306705"/>
           </a:xfrm>
           <a:prstGeom prst="rect">
             <a:avLst/>
@@ -5434,12 +6563,12 @@
                 <a:spcPct val="20000"/>
               </a:spcBef>
               <a:tabLst>
-                <a:tab pos="1027113" algn="l"/>
+                <a:tab pos="1026795" algn="l"/>
               </a:tabLst>
               <a:defRPr/>
             </a:pPr>
             <a:r>
-              <a:rPr lang="en-US" sz="1400" dirty="0" smtClean="0">
+              <a:rPr lang="" altLang="en-US" sz="1400" dirty="0" smtClean="0">
                 <a:effectLst>
                   <a:outerShdw blurRad="38100" dist="38100" dir="2700000" algn="tl">
                     <a:srgbClr val="000000">
@@ -5449,9 +6578,9 @@
                 </a:effectLst>
                 <a:latin typeface="Century Gothic" pitchFamily="34" charset="0"/>
               </a:rPr>
-              <a:t>Title of the project</a:t>
-            </a:r>
-            <a:endParaRPr lang="tr-TR" sz="1400" dirty="0">
+              <a:t>Image Steganography</a:t>
+            </a:r>
+            <a:endParaRPr lang="" altLang="en-US" sz="1400" dirty="0" smtClean="0">
               <a:effectLst>
                 <a:outerShdw blurRad="38100" dist="38100" dir="2700000" algn="tl">
                   <a:srgbClr val="000000">
@@ -5467,9 +6596,7 @@
       <p:sp>
         <p:nvSpPr>
           <p:cNvPr id="5" name="Footer Placeholder 4"/>
-          <p:cNvSpPr txBox="1">
-            <a:spLocks/>
-          </p:cNvSpPr>
+          <p:cNvSpPr txBox="1"/>
           <p:nvPr/>
         </p:nvSpPr>
         <p:spPr>
@@ -5503,7 +6630,6 @@
               <a:buSzTx/>
               <a:buFontTx/>
               <a:buNone/>
-              <a:tabLst/>
               <a:defRPr/>
             </a:pPr>
             <a:fld id="{920BB873-19B1-47CA-9FBA-06779EDAA9C1}" type="slidenum">
@@ -5518,24 +6644,6 @@
                 <a:ea typeface="+mn-ea"/>
                 <a:cs typeface="+mn-cs"/>
               </a:rPr>
-              <a:pPr marL="0" marR="0" lvl="0" indent="0" algn="r" defTabSz="914400" rtl="0" eaLnBrk="1" fontAlgn="auto" latinLnBrk="0" hangingPunct="1">
-                <a:lnSpc>
-                  <a:spcPct val="100000"/>
-                </a:lnSpc>
-                <a:spcBef>
-                  <a:spcPts val="0"/>
-                </a:spcBef>
-                <a:spcAft>
-                  <a:spcPts val="0"/>
-                </a:spcAft>
-                <a:buClrTx/>
-                <a:buSzTx/>
-                <a:buFontTx/>
-                <a:buNone/>
-                <a:tabLst/>
-                <a:defRPr/>
-              </a:pPr>
-              <a:t>8</a:t>
             </a:fld>
             <a:endParaRPr kumimoji="0" lang="en-US" sz="1000" b="1" i="0" u="none" strike="noStrike" kern="1200" cap="none" spc="0" normalizeH="0" baseline="0" noProof="0" dirty="0">
               <a:ln>
@@ -5551,6 +6659,30 @@
           </a:p>
         </p:txBody>
       </p:sp>
+      <p:pic>
+        <p:nvPicPr>
+          <p:cNvPr id="6" name="Picture 5" descr="secure stego proc"/>
+          <p:cNvPicPr>
+            <a:picLocks noChangeAspect="1"/>
+          </p:cNvPicPr>
+          <p:nvPr/>
+        </p:nvPicPr>
+        <p:blipFill>
+          <a:blip r:embed="rId1"/>
+          <a:stretch>
+            <a:fillRect/>
+          </a:stretch>
+        </p:blipFill>
+        <p:spPr>
+          <a:xfrm>
+            <a:off x="542925" y="3830955"/>
+            <a:ext cx="7981950" cy="2295525"/>
+          </a:xfrm>
+          <a:prstGeom prst="rect">
+            <a:avLst/>
+          </a:prstGeom>
+        </p:spPr>
+      </p:pic>
     </p:spTree>
   </p:cSld>
   <p:clrMapOvr>
@@ -5575,14 +6707,7 @@
         <p:cNvGrpSpPr/>
         <p:nvPr/>
       </p:nvGrpSpPr>
-      <p:grpSpPr>
-        <a:xfrm>
-          <a:off x="0" y="0"/>
-          <a:ext cx="0" cy="0"/>
-          <a:chOff x="0" y="0"/>
-          <a:chExt cx="0" cy="0"/>
-        </a:xfrm>
-      </p:grpSpPr>
+      <p:grpSpPr/>
       <p:sp>
         <p:nvSpPr>
           <p:cNvPr id="2" name="Title 1"/>
@@ -5596,14 +6721,13 @@
         <p:spPr/>
         <p:txBody>
           <a:bodyPr/>
-          <a:lstStyle/>
           <a:p>
             <a:pPr algn="l"/>
             <a:r>
-              <a:rPr lang="en-US" dirty="0" smtClean="0"/>
-              <a:t>References (optional)</a:t>
-            </a:r>
-            <a:endParaRPr lang="en-US" dirty="0"/>
+              <a:rPr lang="" altLang="en-US"/>
+              <a:t>Work Done (Cont.)</a:t>
+            </a:r>
+            <a:endParaRPr lang="" altLang="en-US"/>
           </a:p>
         </p:txBody>
       </p:sp>
@@ -5619,176 +6743,71 @@
         </p:nvSpPr>
         <p:spPr/>
         <p:txBody>
-          <a:bodyPr>
-            <a:normAutofit lnSpcReduction="10000"/>
-          </a:bodyPr>
-          <a:lstStyle/>
-          <a:p>
-            <a:r>
-              <a:rPr lang="en-US" sz="1600" dirty="0" err="1" smtClean="0"/>
-              <a:t>Zadeh</a:t>
-            </a:r>
-            <a:r>
-              <a:rPr lang="en-US" sz="1600" dirty="0" smtClean="0"/>
-              <a:t>, L.A., “Fuzzy sets”, </a:t>
-            </a:r>
-            <a:r>
-              <a:rPr lang="en-US" sz="1600" i="1" dirty="0" smtClean="0"/>
-              <a:t>Information and Control</a:t>
-            </a:r>
-            <a:r>
-              <a:rPr lang="en-US" sz="1600" dirty="0" smtClean="0"/>
-              <a:t>, Vol. 8, No. 3, pp. 338–353, June 1965.</a:t>
-            </a:r>
-          </a:p>
-          <a:p>
-            <a:r>
-              <a:rPr lang="en-US" sz="1600" dirty="0" err="1" smtClean="0"/>
-              <a:t>Mamdani</a:t>
-            </a:r>
-            <a:r>
-              <a:rPr lang="en-US" sz="1600" dirty="0" smtClean="0"/>
-              <a:t>, E.H., “Applications of fuzzy algorithms for simple dynamic plant”, </a:t>
-            </a:r>
-            <a:r>
-              <a:rPr lang="en-US" sz="1600" i="1" dirty="0" smtClean="0"/>
-              <a:t>Proceedings of the IEE</a:t>
-            </a:r>
-            <a:r>
-              <a:rPr lang="en-US" sz="1600" dirty="0" smtClean="0"/>
-              <a:t>, Vol. 121, No. 12, pp. 1585–1588, December 1974.</a:t>
-            </a:r>
-          </a:p>
-          <a:p>
-            <a:r>
-              <a:rPr lang="en-US" sz="1600" dirty="0" err="1" smtClean="0"/>
-              <a:t>Utkin</a:t>
-            </a:r>
-            <a:r>
-              <a:rPr lang="en-US" sz="1600" dirty="0" smtClean="0"/>
-              <a:t>, V.I., “Variable structure systems with sliding modes”, </a:t>
-            </a:r>
-            <a:r>
-              <a:rPr lang="en-US" sz="1600" i="1" dirty="0" smtClean="0"/>
-              <a:t>IEEE Transactions on Automatic Control</a:t>
-            </a:r>
-            <a:r>
-              <a:rPr lang="en-US" sz="1600" dirty="0" smtClean="0"/>
-              <a:t>, Vol. AC-22, No. 2, pp. 212–222, April 1977.</a:t>
-            </a:r>
-          </a:p>
-          <a:p>
-            <a:r>
-              <a:rPr lang="en-US" sz="1600" dirty="0" smtClean="0"/>
-              <a:t>Takagi, T., and </a:t>
-            </a:r>
-            <a:r>
-              <a:rPr lang="en-US" sz="1600" dirty="0" err="1" smtClean="0"/>
-              <a:t>Sugeno</a:t>
-            </a:r>
-            <a:r>
-              <a:rPr lang="en-US" sz="1600" dirty="0" smtClean="0"/>
-              <a:t>, M., “Fuzzy identification of systems and its applications to modeling and control”, </a:t>
-            </a:r>
-            <a:r>
-              <a:rPr lang="en-US" sz="1600" i="1" dirty="0" smtClean="0"/>
-              <a:t>IEEE Transactions on Systems, Man, and Cybernetics</a:t>
-            </a:r>
-            <a:r>
-              <a:rPr lang="en-US" sz="1600" dirty="0" smtClean="0"/>
-              <a:t>, Vol. 15, No. 1, pp. 116–132, January/February 1985.</a:t>
-            </a:r>
-          </a:p>
-          <a:p>
-            <a:r>
-              <a:rPr lang="en-US" sz="1600" dirty="0" smtClean="0"/>
-              <a:t>Palm, R., “Sliding mode fuzzy control”, </a:t>
-            </a:r>
-            <a:r>
-              <a:rPr lang="en-US" sz="1600" i="1" dirty="0" smtClean="0"/>
-              <a:t>in Proceedings of the IEEE International Conference on Fuzzy Systems</a:t>
-            </a:r>
-            <a:r>
-              <a:rPr lang="en-US" sz="1600" dirty="0" smtClean="0"/>
-              <a:t>, San Diego, California, USA, pp. 519–526, March 1992.</a:t>
-            </a:r>
-          </a:p>
-          <a:p>
-            <a:r>
-              <a:rPr lang="en-US" sz="1600" dirty="0" smtClean="0"/>
-              <a:t>Song, F., and Smith, S.M., “A comparison of sliding mode fuzzy controller and fuzzy sliding mode controller”, </a:t>
-            </a:r>
-            <a:r>
-              <a:rPr lang="en-US" sz="1600" i="1" dirty="0" smtClean="0"/>
-              <a:t>in Proceedings of the 19th International Conference on the North American Fuzzy Information Processing Society – NAFIPS</a:t>
-            </a:r>
-            <a:r>
-              <a:rPr lang="en-US" sz="1600" dirty="0" smtClean="0"/>
-              <a:t>, Atlanta, Georgia, USA, pp. 480–484, July 2000.</a:t>
-            </a:r>
-          </a:p>
-          <a:p>
-            <a:r>
-              <a:rPr lang="en-US" sz="1600" dirty="0" smtClean="0"/>
-              <a:t>Ogata, K., </a:t>
-            </a:r>
-            <a:r>
-              <a:rPr lang="en-US" sz="1600" i="1" dirty="0" smtClean="0"/>
-              <a:t>Modern Control Engineering</a:t>
-            </a:r>
-            <a:r>
-              <a:rPr lang="en-US" sz="1600" dirty="0" smtClean="0"/>
-              <a:t>. 4th Edition, Prentice-Hall, Upper Saddle River, New Jersey, USA, 2001.</a:t>
-            </a:r>
-          </a:p>
-          <a:p>
-            <a:r>
-              <a:rPr lang="en-US" sz="1600" dirty="0" smtClean="0"/>
-              <a:t>Wang, L.-X., </a:t>
-            </a:r>
-            <a:r>
-              <a:rPr lang="en-US" sz="1600" i="1" dirty="0" smtClean="0"/>
-              <a:t>A Course in Fuzzy Systems and Control</a:t>
-            </a:r>
-            <a:r>
-              <a:rPr lang="en-US" sz="1600" dirty="0" smtClean="0"/>
-              <a:t>. Prentice-Hall, Englewood Cliffs, New Jersey, USA, 1997.</a:t>
-            </a:r>
-          </a:p>
-        </p:txBody>
-      </p:sp>
-      <p:sp>
-        <p:nvSpPr>
-          <p:cNvPr id="4" name="Rectangle 3"/>
-          <p:cNvSpPr/>
+          <a:bodyPr/>
+          <a:p>
+            <a:r>
+              <a:rPr lang="" altLang="en-US"/>
+              <a:t>By doing so the embedding technique follows these rules.</a:t>
+            </a:r>
+            <a:endParaRPr lang="" altLang="en-US"/>
+          </a:p>
+        </p:txBody>
+      </p:sp>
+      <p:pic>
+        <p:nvPicPr>
+          <p:cNvPr id="4" name="Picture 3" descr="bit embedding procedure"/>
+          <p:cNvPicPr>
+            <a:picLocks noChangeAspect="1"/>
+          </p:cNvPicPr>
           <p:nvPr/>
-        </p:nvSpPr>
+        </p:nvPicPr>
+        <p:blipFill>
+          <a:blip r:embed="rId1"/>
+          <a:stretch>
+            <a:fillRect/>
+          </a:stretch>
+        </p:blipFill>
         <p:spPr>
           <a:xfrm>
-            <a:off x="3200400" y="6474023"/>
-            <a:ext cx="2667000" cy="307777"/>
+            <a:off x="2310765" y="2684780"/>
+            <a:ext cx="4523105" cy="3441700"/>
           </a:xfrm>
           <a:prstGeom prst="rect">
             <a:avLst/>
           </a:prstGeom>
         </p:spPr>
+      </p:pic>
+      <p:sp>
+        <p:nvSpPr>
+          <p:cNvPr id="5" name="Rectangle 4"/>
+          <p:cNvSpPr/>
+          <p:nvPr/>
+        </p:nvSpPr>
+        <p:spPr>
+          <a:xfrm>
+            <a:off x="3200400" y="6474023"/>
+            <a:ext cx="2667000" cy="306705"/>
+          </a:xfrm>
+          <a:prstGeom prst="rect">
+            <a:avLst/>
+          </a:prstGeom>
+        </p:spPr>
         <p:txBody>
           <a:bodyPr wrap="square">
             <a:spAutoFit/>
           </a:bodyPr>
-          <a:lstStyle/>
           <a:p>
             <a:pPr lvl="0" algn="ctr">
               <a:spcBef>
                 <a:spcPct val="20000"/>
               </a:spcBef>
               <a:tabLst>
-                <a:tab pos="1027113" algn="l"/>
+                <a:tab pos="1026795" algn="l"/>
               </a:tabLst>
               <a:defRPr/>
             </a:pPr>
             <a:r>
-              <a:rPr lang="en-US" sz="1400" dirty="0" smtClean="0">
+              <a:rPr lang="en-US" altLang="en-US" sz="1400" dirty="0" smtClean="0">
                 <a:effectLst>
                   <a:outerShdw blurRad="38100" dist="38100" dir="2700000" algn="tl">
                     <a:srgbClr val="000000">
@@ -5798,9 +6817,9 @@
                 </a:effectLst>
                 <a:latin typeface="Century Gothic" pitchFamily="34" charset="0"/>
               </a:rPr>
-              <a:t>Title of the project</a:t>
-            </a:r>
-            <a:endParaRPr lang="tr-TR" sz="1400" dirty="0">
+              <a:t>Image Steganography</a:t>
+            </a:r>
+            <a:endParaRPr lang="en-US" altLang="en-US" sz="1400" dirty="0" smtClean="0">
               <a:effectLst>
                 <a:outerShdw blurRad="38100" dist="38100" dir="2700000" algn="tl">
                   <a:srgbClr val="000000">
@@ -5813,105 +6832,11 @@
           </a:p>
         </p:txBody>
       </p:sp>
-      <p:sp>
-        <p:nvSpPr>
-          <p:cNvPr id="5" name="Footer Placeholder 4"/>
-          <p:cNvSpPr txBox="1">
-            <a:spLocks/>
-          </p:cNvSpPr>
-          <p:nvPr/>
-        </p:nvSpPr>
-        <p:spPr>
-          <a:xfrm>
-            <a:off x="8305800" y="6462444"/>
-            <a:ext cx="762000" cy="299608"/>
-          </a:xfrm>
-          <a:prstGeom prst="rect">
-            <a:avLst/>
-          </a:prstGeom>
-        </p:spPr>
-        <p:txBody>
-          <a:bodyPr vert="horz" lIns="91440" tIns="45720" rIns="91440" bIns="45720" rtlCol="0" anchor="ctr"/>
-          <a:lstStyle>
-            <a:lvl1pPr>
-              <a:defRPr sz="1200"/>
-            </a:lvl1pPr>
-          </a:lstStyle>
-          <a:p>
-            <a:pPr marL="0" marR="0" lvl="0" indent="0" algn="r" defTabSz="914400" rtl="0" eaLnBrk="1" fontAlgn="auto" latinLnBrk="0" hangingPunct="1">
-              <a:lnSpc>
-                <a:spcPct val="100000"/>
-              </a:lnSpc>
-              <a:spcBef>
-                <a:spcPts val="0"/>
-              </a:spcBef>
-              <a:spcAft>
-                <a:spcPts val="0"/>
-              </a:spcAft>
-              <a:buClrTx/>
-              <a:buSzTx/>
-              <a:buFontTx/>
-              <a:buNone/>
-              <a:tabLst/>
-              <a:defRPr/>
-            </a:pPr>
-            <a:fld id="{920BB873-19B1-47CA-9FBA-06779EDAA9C1}" type="slidenum">
-              <a:rPr kumimoji="0" lang="en-US" sz="1000" b="1" i="0" u="none" strike="noStrike" kern="1200" cap="none" spc="0" normalizeH="0" baseline="0" noProof="0" smtClean="0">
-                <a:ln>
-                  <a:noFill/>
-                </a:ln>
-                <a:effectLst/>
-                <a:uLnTx/>
-                <a:uFillTx/>
-                <a:latin typeface="Lucida Bright" pitchFamily="18" charset="0"/>
-                <a:ea typeface="+mn-ea"/>
-                <a:cs typeface="+mn-cs"/>
-              </a:rPr>
-              <a:pPr marL="0" marR="0" lvl="0" indent="0" algn="r" defTabSz="914400" rtl="0" eaLnBrk="1" fontAlgn="auto" latinLnBrk="0" hangingPunct="1">
-                <a:lnSpc>
-                  <a:spcPct val="100000"/>
-                </a:lnSpc>
-                <a:spcBef>
-                  <a:spcPts val="0"/>
-                </a:spcBef>
-                <a:spcAft>
-                  <a:spcPts val="0"/>
-                </a:spcAft>
-                <a:buClrTx/>
-                <a:buSzTx/>
-                <a:buFontTx/>
-                <a:buNone/>
-                <a:tabLst/>
-                <a:defRPr/>
-              </a:pPr>
-              <a:t>9</a:t>
-            </a:fld>
-            <a:endParaRPr kumimoji="0" lang="en-US" sz="1000" b="1" i="0" u="none" strike="noStrike" kern="1200" cap="none" spc="0" normalizeH="0" baseline="0" noProof="0" dirty="0">
-              <a:ln>
-                <a:noFill/>
-              </a:ln>
-              <a:effectLst/>
-              <a:uLnTx/>
-              <a:uFillTx/>
-              <a:latin typeface="Lucida Bright" pitchFamily="18" charset="0"/>
-              <a:ea typeface="+mn-ea"/>
-              <a:cs typeface="+mn-cs"/>
-            </a:endParaRPr>
-          </a:p>
-        </p:txBody>
-      </p:sp>
     </p:spTree>
   </p:cSld>
   <p:clrMapOvr>
     <a:masterClrMapping/>
   </p:clrMapOvr>
-  <p:timing>
-    <p:tnLst>
-      <p:par>
-        <p:cTn id="1" dur="indefinite" restart="never" nodeType="tmRoot"/>
-      </p:par>
-    </p:tnLst>
-  </p:timing>
 </p:sld>
 </file>
 
@@ -6193,7 +7118,269 @@
       </a:bgFillStyleLst>
     </a:fmtScheme>
   </a:themeElements>
-  <a:objectDefaults/>
-  <a:extraClrSchemeLst/>
+  <a:extLst>
+    <a:ext uri="{05A4C25C-085E-4340-85A3-A5531E510DB2}">
+      <thm15:themeFamily xmlns:thm15="http://schemas.microsoft.com/office/thememl/2012/main" name="Office Theme" id="{62F939B6-93AF-4DB8-9C6B-D6C7DFDC589F}" vid="{4A3C46E8-61CC-4603-A589-7422A47A8E4A}"/>
+    </a:ext>
+  </a:extLst>
+</a:theme>
+</file>
+
+<file path=ppt/theme/theme2.xml><?xml version="1.0" encoding="utf-8"?>
+<a:theme xmlns:a="http://schemas.openxmlformats.org/drawingml/2006/main" name="Office Theme">
+  <a:themeElements>
+    <a:clrScheme name="Office">
+      <a:dk1>
+        <a:sysClr val="windowText" lastClr="000000"/>
+      </a:dk1>
+      <a:lt1>
+        <a:sysClr val="window" lastClr="FFFFFF"/>
+      </a:lt1>
+      <a:dk2>
+        <a:srgbClr val="44546A"/>
+      </a:dk2>
+      <a:lt2>
+        <a:srgbClr val="E7E6E6"/>
+      </a:lt2>
+      <a:accent1>
+        <a:srgbClr val="5B9BD5"/>
+      </a:accent1>
+      <a:accent2>
+        <a:srgbClr val="ED7D31"/>
+      </a:accent2>
+      <a:accent3>
+        <a:srgbClr val="A5A5A5"/>
+      </a:accent3>
+      <a:accent4>
+        <a:srgbClr val="FFC000"/>
+      </a:accent4>
+      <a:accent5>
+        <a:srgbClr val="4472C4"/>
+      </a:accent5>
+      <a:accent6>
+        <a:srgbClr val="70AD47"/>
+      </a:accent6>
+      <a:hlink>
+        <a:srgbClr val="0563C1"/>
+      </a:hlink>
+      <a:folHlink>
+        <a:srgbClr val="954F72"/>
+      </a:folHlink>
+    </a:clrScheme>
+    <a:fontScheme name="Office">
+      <a:majorFont>
+        <a:latin typeface="Calibri Light"/>
+        <a:ea typeface=""/>
+        <a:cs typeface=""/>
+        <a:font script="Jpan" typeface="ＭＳ Ｐゴシック"/>
+        <a:font script="Hang" typeface="맑은 고딕"/>
+        <a:font script="Hans" typeface="宋体"/>
+        <a:font script="Hant" typeface="新細明體"/>
+        <a:font script="Arab" typeface="Times New Roman"/>
+        <a:font script="Hebr" typeface="Times New Roman"/>
+        <a:font script="Thai" typeface="Angsana New"/>
+        <a:font script="Ethi" typeface="Nyala"/>
+        <a:font script="Beng" typeface="Vrinda"/>
+        <a:font script="Gujr" typeface="Shruti"/>
+        <a:font script="Khmr" typeface="MoolBoran"/>
+        <a:font script="Knda" typeface="Tunga"/>
+        <a:font script="Guru" typeface="Raavi"/>
+        <a:font script="Cans" typeface="Euphemia"/>
+        <a:font script="Cher" typeface="Plantagenet Cherokee"/>
+        <a:font script="Yiii" typeface="Microsoft Yi Baiti"/>
+        <a:font script="Tibt" typeface="Microsoft Himalaya"/>
+        <a:font script="Thaa" typeface="MV Boli"/>
+        <a:font script="Deva" typeface="Mangal"/>
+        <a:font script="Telu" typeface="Gautami"/>
+        <a:font script="Taml" typeface="Latha"/>
+        <a:font script="Syrc" typeface="Estrangelo Edessa"/>
+        <a:font script="Orya" typeface="Kalinga"/>
+        <a:font script="Mlym" typeface="Kartika"/>
+        <a:font script="Laoo" typeface="DokChampa"/>
+        <a:font script="Sinh" typeface="Iskoola Pota"/>
+        <a:font script="Mong" typeface="Mongolian Baiti"/>
+        <a:font script="Viet" typeface="Times New Roman"/>
+        <a:font script="Uigh" typeface="Microsoft Uighur"/>
+        <a:font script="Geor" typeface="Sylfaen"/>
+      </a:majorFont>
+      <a:minorFont>
+        <a:latin typeface="Calibri"/>
+        <a:ea typeface=""/>
+        <a:cs typeface=""/>
+        <a:font script="Jpan" typeface="ＭＳ Ｐゴシック"/>
+        <a:font script="Hang" typeface="맑은 고딕"/>
+        <a:font script="Hans" typeface="宋体"/>
+        <a:font script="Hant" typeface="新細明體"/>
+        <a:font script="Arab" typeface="Arial"/>
+        <a:font script="Hebr" typeface="Arial"/>
+        <a:font script="Thai" typeface="Cordia New"/>
+        <a:font script="Ethi" typeface="Nyala"/>
+        <a:font script="Beng" typeface="Vrinda"/>
+        <a:font script="Gujr" typeface="Shruti"/>
+        <a:font script="Khmr" typeface="DaunPenh"/>
+        <a:font script="Knda" typeface="Tunga"/>
+        <a:font script="Guru" typeface="Raavi"/>
+        <a:font script="Cans" typeface="Euphemia"/>
+        <a:font script="Cher" typeface="Plantagenet Cherokee"/>
+        <a:font script="Yiii" typeface="Microsoft Yi Baiti"/>
+        <a:font script="Tibt" typeface="Microsoft Himalaya"/>
+        <a:font script="Thaa" typeface="MV Boli"/>
+        <a:font script="Deva" typeface="Mangal"/>
+        <a:font script="Telu" typeface="Gautami"/>
+        <a:font script="Taml" typeface="Latha"/>
+        <a:font script="Syrc" typeface="Estrangelo Edessa"/>
+        <a:font script="Orya" typeface="Kalinga"/>
+        <a:font script="Mlym" typeface="Kartika"/>
+        <a:font script="Laoo" typeface="DokChampa"/>
+        <a:font script="Sinh" typeface="Iskoola Pota"/>
+        <a:font script="Mong" typeface="Mongolian Baiti"/>
+        <a:font script="Viet" typeface="Arial"/>
+        <a:font script="Uigh" typeface="Microsoft Uighur"/>
+        <a:font script="Geor" typeface="Sylfaen"/>
+      </a:minorFont>
+    </a:fontScheme>
+    <a:fmtScheme name="Office">
+      <a:fillStyleLst>
+        <a:solidFill>
+          <a:schemeClr val="phClr"/>
+        </a:solidFill>
+        <a:gradFill rotWithShape="1">
+          <a:gsLst>
+            <a:gs pos="0">
+              <a:schemeClr val="phClr">
+                <a:lumMod val="110000"/>
+                <a:satMod val="105000"/>
+                <a:tint val="67000"/>
+              </a:schemeClr>
+            </a:gs>
+            <a:gs pos="50000">
+              <a:schemeClr val="phClr">
+                <a:lumMod val="105000"/>
+                <a:satMod val="103000"/>
+                <a:tint val="73000"/>
+              </a:schemeClr>
+            </a:gs>
+            <a:gs pos="100000">
+              <a:schemeClr val="phClr">
+                <a:lumMod val="105000"/>
+                <a:satMod val="109000"/>
+                <a:tint val="81000"/>
+              </a:schemeClr>
+            </a:gs>
+          </a:gsLst>
+          <a:lin ang="5400000" scaled="0"/>
+        </a:gradFill>
+        <a:gradFill rotWithShape="1">
+          <a:gsLst>
+            <a:gs pos="0">
+              <a:schemeClr val="phClr">
+                <a:satMod val="103000"/>
+                <a:lumMod val="102000"/>
+                <a:tint val="94000"/>
+              </a:schemeClr>
+            </a:gs>
+            <a:gs pos="50000">
+              <a:schemeClr val="phClr">
+                <a:satMod val="110000"/>
+                <a:lumMod val="100000"/>
+                <a:shade val="100000"/>
+              </a:schemeClr>
+            </a:gs>
+            <a:gs pos="100000">
+              <a:schemeClr val="phClr">
+                <a:lumMod val="99000"/>
+                <a:satMod val="120000"/>
+                <a:shade val="78000"/>
+              </a:schemeClr>
+            </a:gs>
+          </a:gsLst>
+          <a:lin ang="5400000" scaled="0"/>
+        </a:gradFill>
+      </a:fillStyleLst>
+      <a:lnStyleLst>
+        <a:ln w="6350" cap="flat" cmpd="sng" algn="ctr">
+          <a:solidFill>
+            <a:schemeClr val="phClr"/>
+          </a:solidFill>
+          <a:prstDash val="solid"/>
+          <a:miter lim="800000"/>
+        </a:ln>
+        <a:ln w="12700" cap="flat" cmpd="sng" algn="ctr">
+          <a:solidFill>
+            <a:schemeClr val="phClr"/>
+          </a:solidFill>
+          <a:prstDash val="solid"/>
+          <a:miter lim="800000"/>
+        </a:ln>
+        <a:ln w="19050" cap="flat" cmpd="sng" algn="ctr">
+          <a:solidFill>
+            <a:schemeClr val="phClr"/>
+          </a:solidFill>
+          <a:prstDash val="solid"/>
+          <a:miter lim="800000"/>
+        </a:ln>
+      </a:lnStyleLst>
+      <a:effectStyleLst>
+        <a:effectStyle>
+          <a:effectLst/>
+        </a:effectStyle>
+        <a:effectStyle>
+          <a:effectLst/>
+        </a:effectStyle>
+        <a:effectStyle>
+          <a:effectLst>
+            <a:outerShdw blurRad="57150" dist="19050" dir="5400000" algn="ctr" rotWithShape="0">
+              <a:srgbClr val="000000">
+                <a:alpha val="63000"/>
+              </a:srgbClr>
+            </a:outerShdw>
+          </a:effectLst>
+        </a:effectStyle>
+      </a:effectStyleLst>
+      <a:bgFillStyleLst>
+        <a:solidFill>
+          <a:schemeClr val="phClr"/>
+        </a:solidFill>
+        <a:solidFill>
+          <a:schemeClr val="phClr">
+            <a:tint val="95000"/>
+            <a:satMod val="170000"/>
+          </a:schemeClr>
+        </a:solidFill>
+        <a:gradFill rotWithShape="1">
+          <a:gsLst>
+            <a:gs pos="0">
+              <a:schemeClr val="phClr">
+                <a:tint val="93000"/>
+                <a:satMod val="150000"/>
+                <a:shade val="98000"/>
+                <a:lumMod val="102000"/>
+              </a:schemeClr>
+            </a:gs>
+            <a:gs pos="50000">
+              <a:schemeClr val="phClr">
+                <a:tint val="98000"/>
+                <a:satMod val="130000"/>
+                <a:shade val="90000"/>
+                <a:lumMod val="103000"/>
+              </a:schemeClr>
+            </a:gs>
+            <a:gs pos="100000">
+              <a:schemeClr val="phClr">
+                <a:shade val="63000"/>
+                <a:satMod val="120000"/>
+              </a:schemeClr>
+            </a:gs>
+          </a:gsLst>
+          <a:lin ang="5400000" scaled="0"/>
+        </a:gradFill>
+      </a:bgFillStyleLst>
+    </a:fmtScheme>
+  </a:themeElements>
+  <a:extLst>
+    <a:ext uri="{05A4C25C-085E-4340-85A3-A5531E510DB2}">
+      <thm15:themeFamily xmlns:thm15="http://schemas.microsoft.com/office/thememl/2012/main" name="Office Theme" id="{62F939B6-93AF-4DB8-9C6B-D6C7DFDC589F}" vid="{4A3C46E8-61CC-4603-A589-7422A47A8E4A}"/>
+    </a:ext>
+  </a:extLst>
 </a:theme>
 </file>
</xml_diff>